<commit_message>
wyk 1 lab 1
</commit_message>
<xml_diff>
--- a/2021-2022/Wykład/Wyklad1.pptx
+++ b/2021-2022/Wykład/Wyklad1.pptx
@@ -5,10 +5,10 @@
     <p:sldMasterId id="2147483696" r:id="rId1"/>
   </p:sldMasterIdLst>
   <p:notesMasterIdLst>
-    <p:notesMasterId r:id="rId8"/>
+    <p:notesMasterId r:id="rId19"/>
   </p:notesMasterIdLst>
   <p:handoutMasterIdLst>
-    <p:handoutMasterId r:id="rId9"/>
+    <p:handoutMasterId r:id="rId20"/>
   </p:handoutMasterIdLst>
   <p:sldIdLst>
     <p:sldId id="346" r:id="rId2"/>
@@ -17,6 +17,17 @@
     <p:sldId id="505" r:id="rId5"/>
     <p:sldId id="506" r:id="rId6"/>
     <p:sldId id="507" r:id="rId7"/>
+    <p:sldId id="508" r:id="rId8"/>
+    <p:sldId id="509" r:id="rId9"/>
+    <p:sldId id="510" r:id="rId10"/>
+    <p:sldId id="511" r:id="rId11"/>
+    <p:sldId id="512" r:id="rId12"/>
+    <p:sldId id="513" r:id="rId13"/>
+    <p:sldId id="514" r:id="rId14"/>
+    <p:sldId id="515" r:id="rId15"/>
+    <p:sldId id="516" r:id="rId16"/>
+    <p:sldId id="517" r:id="rId17"/>
+    <p:sldId id="518" r:id="rId18"/>
   </p:sldIdLst>
   <p:sldSz cx="9144000" cy="6858000" type="screen4x3"/>
   <p:notesSz cx="6858000" cy="9144000"/>
@@ -277,7 +288,7 @@
           <a:p>
             <a:fld id="{5113504E-0C99-2340-A5F6-DD6E1A87C372}" type="datetimeFigureOut">
               <a:rPr lang="pl-PL" smtClean="0"/>
-              <a:t>12.02.2022</a:t>
+              <a:t>01.03.2022</a:t>
             </a:fld>
             <a:endParaRPr lang="pl-PL"/>
           </a:p>
@@ -443,7 +454,7 @@
           <a:p>
             <a:fld id="{F78C933E-44E9-2D43-91B0-0D2BEEFA7EB9}" type="datetimeFigureOut">
               <a:rPr lang="pl-PL" smtClean="0"/>
-              <a:t>12.02.2022</a:t>
+              <a:t>01.03.2022</a:t>
             </a:fld>
             <a:endParaRPr lang="pl-PL"/>
           </a:p>
@@ -795,6 +806,702 @@
 </p:notes>
 </file>
 
+<file path=ppt/notesSlides/notesSlide10.xml><?xml version="1.0" encoding="utf-8"?>
+<p:notes xmlns:a="http://schemas.openxmlformats.org/drawingml/2006/main" xmlns:r="http://schemas.openxmlformats.org/officeDocument/2006/relationships" xmlns:p="http://schemas.openxmlformats.org/presentationml/2006/main">
+  <p:cSld>
+    <p:spTree>
+      <p:nvGrpSpPr>
+        <p:cNvPr id="1" name=""/>
+        <p:cNvGrpSpPr/>
+        <p:nvPr/>
+      </p:nvGrpSpPr>
+      <p:grpSpPr>
+        <a:xfrm>
+          <a:off x="0" y="0"/>
+          <a:ext cx="0" cy="0"/>
+          <a:chOff x="0" y="0"/>
+          <a:chExt cx="0" cy="0"/>
+        </a:xfrm>
+      </p:grpSpPr>
+      <p:sp>
+        <p:nvSpPr>
+          <p:cNvPr id="2" name="Slide Image Placeholder 1"/>
+          <p:cNvSpPr>
+            <a:spLocks noGrp="1" noRot="1" noChangeAspect="1"/>
+          </p:cNvSpPr>
+          <p:nvPr>
+            <p:ph type="sldImg"/>
+          </p:nvPr>
+        </p:nvSpPr>
+        <p:spPr/>
+      </p:sp>
+      <p:sp>
+        <p:nvSpPr>
+          <p:cNvPr id="3" name="Notes Placeholder 2"/>
+          <p:cNvSpPr>
+            <a:spLocks noGrp="1"/>
+          </p:cNvSpPr>
+          <p:nvPr>
+            <p:ph type="body" idx="1"/>
+          </p:nvPr>
+        </p:nvSpPr>
+        <p:spPr/>
+        <p:txBody>
+          <a:bodyPr/>
+          <a:lstStyle/>
+          <a:p>
+            <a:pPr rtl="0"/>
+            <a:endParaRPr lang="pl-PL" dirty="0">
+              <a:effectLst/>
+            </a:endParaRPr>
+          </a:p>
+        </p:txBody>
+      </p:sp>
+      <p:sp>
+        <p:nvSpPr>
+          <p:cNvPr id="4" name="Slide Number Placeholder 3"/>
+          <p:cNvSpPr>
+            <a:spLocks noGrp="1"/>
+          </p:cNvSpPr>
+          <p:nvPr>
+            <p:ph type="sldNum" sz="quarter" idx="10"/>
+          </p:nvPr>
+        </p:nvSpPr>
+        <p:spPr/>
+        <p:txBody>
+          <a:bodyPr/>
+          <a:lstStyle/>
+          <a:p>
+            <a:fld id="{79CE77F9-1A7F-B148-A0AA-5828300D10BC}" type="slidenum">
+              <a:rPr lang="pl-PL" smtClean="0"/>
+              <a:t>10</a:t>
+            </a:fld>
+            <a:endParaRPr lang="pl-PL"/>
+          </a:p>
+        </p:txBody>
+      </p:sp>
+    </p:spTree>
+    <p:extLst>
+      <p:ext uri="{BB962C8B-B14F-4D97-AF65-F5344CB8AC3E}">
+        <p14:creationId xmlns:p14="http://schemas.microsoft.com/office/powerpoint/2010/main" val="1287277024"/>
+      </p:ext>
+    </p:extLst>
+  </p:cSld>
+  <p:clrMapOvr>
+    <a:masterClrMapping/>
+  </p:clrMapOvr>
+</p:notes>
+</file>
+
+<file path=ppt/notesSlides/notesSlide11.xml><?xml version="1.0" encoding="utf-8"?>
+<p:notes xmlns:a="http://schemas.openxmlformats.org/drawingml/2006/main" xmlns:r="http://schemas.openxmlformats.org/officeDocument/2006/relationships" xmlns:p="http://schemas.openxmlformats.org/presentationml/2006/main">
+  <p:cSld>
+    <p:spTree>
+      <p:nvGrpSpPr>
+        <p:cNvPr id="1" name=""/>
+        <p:cNvGrpSpPr/>
+        <p:nvPr/>
+      </p:nvGrpSpPr>
+      <p:grpSpPr>
+        <a:xfrm>
+          <a:off x="0" y="0"/>
+          <a:ext cx="0" cy="0"/>
+          <a:chOff x="0" y="0"/>
+          <a:chExt cx="0" cy="0"/>
+        </a:xfrm>
+      </p:grpSpPr>
+      <p:sp>
+        <p:nvSpPr>
+          <p:cNvPr id="2" name="Slide Image Placeholder 1"/>
+          <p:cNvSpPr>
+            <a:spLocks noGrp="1" noRot="1" noChangeAspect="1"/>
+          </p:cNvSpPr>
+          <p:nvPr>
+            <p:ph type="sldImg"/>
+          </p:nvPr>
+        </p:nvSpPr>
+        <p:spPr/>
+      </p:sp>
+      <p:sp>
+        <p:nvSpPr>
+          <p:cNvPr id="3" name="Notes Placeholder 2"/>
+          <p:cNvSpPr>
+            <a:spLocks noGrp="1"/>
+          </p:cNvSpPr>
+          <p:nvPr>
+            <p:ph type="body" idx="1"/>
+          </p:nvPr>
+        </p:nvSpPr>
+        <p:spPr/>
+        <p:txBody>
+          <a:bodyPr/>
+          <a:lstStyle/>
+          <a:p>
+            <a:pPr rtl="0"/>
+            <a:endParaRPr lang="pl-PL" dirty="0">
+              <a:effectLst/>
+            </a:endParaRPr>
+          </a:p>
+        </p:txBody>
+      </p:sp>
+      <p:sp>
+        <p:nvSpPr>
+          <p:cNvPr id="4" name="Slide Number Placeholder 3"/>
+          <p:cNvSpPr>
+            <a:spLocks noGrp="1"/>
+          </p:cNvSpPr>
+          <p:nvPr>
+            <p:ph type="sldNum" sz="quarter" idx="10"/>
+          </p:nvPr>
+        </p:nvSpPr>
+        <p:spPr/>
+        <p:txBody>
+          <a:bodyPr/>
+          <a:lstStyle/>
+          <a:p>
+            <a:fld id="{79CE77F9-1A7F-B148-A0AA-5828300D10BC}" type="slidenum">
+              <a:rPr lang="pl-PL" smtClean="0"/>
+              <a:t>11</a:t>
+            </a:fld>
+            <a:endParaRPr lang="pl-PL"/>
+          </a:p>
+        </p:txBody>
+      </p:sp>
+    </p:spTree>
+    <p:extLst>
+      <p:ext uri="{BB962C8B-B14F-4D97-AF65-F5344CB8AC3E}">
+        <p14:creationId xmlns:p14="http://schemas.microsoft.com/office/powerpoint/2010/main" val="2397103631"/>
+      </p:ext>
+    </p:extLst>
+  </p:cSld>
+  <p:clrMapOvr>
+    <a:masterClrMapping/>
+  </p:clrMapOvr>
+</p:notes>
+</file>
+
+<file path=ppt/notesSlides/notesSlide12.xml><?xml version="1.0" encoding="utf-8"?>
+<p:notes xmlns:a="http://schemas.openxmlformats.org/drawingml/2006/main" xmlns:r="http://schemas.openxmlformats.org/officeDocument/2006/relationships" xmlns:p="http://schemas.openxmlformats.org/presentationml/2006/main">
+  <p:cSld>
+    <p:spTree>
+      <p:nvGrpSpPr>
+        <p:cNvPr id="1" name=""/>
+        <p:cNvGrpSpPr/>
+        <p:nvPr/>
+      </p:nvGrpSpPr>
+      <p:grpSpPr>
+        <a:xfrm>
+          <a:off x="0" y="0"/>
+          <a:ext cx="0" cy="0"/>
+          <a:chOff x="0" y="0"/>
+          <a:chExt cx="0" cy="0"/>
+        </a:xfrm>
+      </p:grpSpPr>
+      <p:sp>
+        <p:nvSpPr>
+          <p:cNvPr id="2" name="Slide Image Placeholder 1"/>
+          <p:cNvSpPr>
+            <a:spLocks noGrp="1" noRot="1" noChangeAspect="1"/>
+          </p:cNvSpPr>
+          <p:nvPr>
+            <p:ph type="sldImg"/>
+          </p:nvPr>
+        </p:nvSpPr>
+        <p:spPr/>
+      </p:sp>
+      <p:sp>
+        <p:nvSpPr>
+          <p:cNvPr id="3" name="Notes Placeholder 2"/>
+          <p:cNvSpPr>
+            <a:spLocks noGrp="1"/>
+          </p:cNvSpPr>
+          <p:nvPr>
+            <p:ph type="body" idx="1"/>
+          </p:nvPr>
+        </p:nvSpPr>
+        <p:spPr/>
+        <p:txBody>
+          <a:bodyPr/>
+          <a:lstStyle/>
+          <a:p>
+            <a:pPr rtl="0"/>
+            <a:endParaRPr lang="pl-PL" dirty="0">
+              <a:effectLst/>
+            </a:endParaRPr>
+          </a:p>
+        </p:txBody>
+      </p:sp>
+      <p:sp>
+        <p:nvSpPr>
+          <p:cNvPr id="4" name="Slide Number Placeholder 3"/>
+          <p:cNvSpPr>
+            <a:spLocks noGrp="1"/>
+          </p:cNvSpPr>
+          <p:nvPr>
+            <p:ph type="sldNum" sz="quarter" idx="10"/>
+          </p:nvPr>
+        </p:nvSpPr>
+        <p:spPr/>
+        <p:txBody>
+          <a:bodyPr/>
+          <a:lstStyle/>
+          <a:p>
+            <a:fld id="{79CE77F9-1A7F-B148-A0AA-5828300D10BC}" type="slidenum">
+              <a:rPr lang="pl-PL" smtClean="0"/>
+              <a:t>12</a:t>
+            </a:fld>
+            <a:endParaRPr lang="pl-PL"/>
+          </a:p>
+        </p:txBody>
+      </p:sp>
+    </p:spTree>
+    <p:extLst>
+      <p:ext uri="{BB962C8B-B14F-4D97-AF65-F5344CB8AC3E}">
+        <p14:creationId xmlns:p14="http://schemas.microsoft.com/office/powerpoint/2010/main" val="1569502789"/>
+      </p:ext>
+    </p:extLst>
+  </p:cSld>
+  <p:clrMapOvr>
+    <a:masterClrMapping/>
+  </p:clrMapOvr>
+</p:notes>
+</file>
+
+<file path=ppt/notesSlides/notesSlide13.xml><?xml version="1.0" encoding="utf-8"?>
+<p:notes xmlns:a="http://schemas.openxmlformats.org/drawingml/2006/main" xmlns:r="http://schemas.openxmlformats.org/officeDocument/2006/relationships" xmlns:p="http://schemas.openxmlformats.org/presentationml/2006/main">
+  <p:cSld>
+    <p:spTree>
+      <p:nvGrpSpPr>
+        <p:cNvPr id="1" name=""/>
+        <p:cNvGrpSpPr/>
+        <p:nvPr/>
+      </p:nvGrpSpPr>
+      <p:grpSpPr>
+        <a:xfrm>
+          <a:off x="0" y="0"/>
+          <a:ext cx="0" cy="0"/>
+          <a:chOff x="0" y="0"/>
+          <a:chExt cx="0" cy="0"/>
+        </a:xfrm>
+      </p:grpSpPr>
+      <p:sp>
+        <p:nvSpPr>
+          <p:cNvPr id="2" name="Slide Image Placeholder 1"/>
+          <p:cNvSpPr>
+            <a:spLocks noGrp="1" noRot="1" noChangeAspect="1"/>
+          </p:cNvSpPr>
+          <p:nvPr>
+            <p:ph type="sldImg"/>
+          </p:nvPr>
+        </p:nvSpPr>
+        <p:spPr/>
+      </p:sp>
+      <p:sp>
+        <p:nvSpPr>
+          <p:cNvPr id="3" name="Notes Placeholder 2"/>
+          <p:cNvSpPr>
+            <a:spLocks noGrp="1"/>
+          </p:cNvSpPr>
+          <p:nvPr>
+            <p:ph type="body" idx="1"/>
+          </p:nvPr>
+        </p:nvSpPr>
+        <p:spPr/>
+        <p:txBody>
+          <a:bodyPr/>
+          <a:lstStyle/>
+          <a:p>
+            <a:pPr rtl="0"/>
+            <a:endParaRPr lang="pl-PL" dirty="0">
+              <a:effectLst/>
+            </a:endParaRPr>
+          </a:p>
+        </p:txBody>
+      </p:sp>
+      <p:sp>
+        <p:nvSpPr>
+          <p:cNvPr id="4" name="Slide Number Placeholder 3"/>
+          <p:cNvSpPr>
+            <a:spLocks noGrp="1"/>
+          </p:cNvSpPr>
+          <p:nvPr>
+            <p:ph type="sldNum" sz="quarter" idx="10"/>
+          </p:nvPr>
+        </p:nvSpPr>
+        <p:spPr/>
+        <p:txBody>
+          <a:bodyPr/>
+          <a:lstStyle/>
+          <a:p>
+            <a:fld id="{79CE77F9-1A7F-B148-A0AA-5828300D10BC}" type="slidenum">
+              <a:rPr lang="pl-PL" smtClean="0"/>
+              <a:t>13</a:t>
+            </a:fld>
+            <a:endParaRPr lang="pl-PL"/>
+          </a:p>
+        </p:txBody>
+      </p:sp>
+    </p:spTree>
+    <p:extLst>
+      <p:ext uri="{BB962C8B-B14F-4D97-AF65-F5344CB8AC3E}">
+        <p14:creationId xmlns:p14="http://schemas.microsoft.com/office/powerpoint/2010/main" val="3796402815"/>
+      </p:ext>
+    </p:extLst>
+  </p:cSld>
+  <p:clrMapOvr>
+    <a:masterClrMapping/>
+  </p:clrMapOvr>
+</p:notes>
+</file>
+
+<file path=ppt/notesSlides/notesSlide14.xml><?xml version="1.0" encoding="utf-8"?>
+<p:notes xmlns:a="http://schemas.openxmlformats.org/drawingml/2006/main" xmlns:r="http://schemas.openxmlformats.org/officeDocument/2006/relationships" xmlns:p="http://schemas.openxmlformats.org/presentationml/2006/main">
+  <p:cSld>
+    <p:spTree>
+      <p:nvGrpSpPr>
+        <p:cNvPr id="1" name=""/>
+        <p:cNvGrpSpPr/>
+        <p:nvPr/>
+      </p:nvGrpSpPr>
+      <p:grpSpPr>
+        <a:xfrm>
+          <a:off x="0" y="0"/>
+          <a:ext cx="0" cy="0"/>
+          <a:chOff x="0" y="0"/>
+          <a:chExt cx="0" cy="0"/>
+        </a:xfrm>
+      </p:grpSpPr>
+      <p:sp>
+        <p:nvSpPr>
+          <p:cNvPr id="2" name="Slide Image Placeholder 1"/>
+          <p:cNvSpPr>
+            <a:spLocks noGrp="1" noRot="1" noChangeAspect="1"/>
+          </p:cNvSpPr>
+          <p:nvPr>
+            <p:ph type="sldImg"/>
+          </p:nvPr>
+        </p:nvSpPr>
+        <p:spPr/>
+      </p:sp>
+      <p:sp>
+        <p:nvSpPr>
+          <p:cNvPr id="3" name="Notes Placeholder 2"/>
+          <p:cNvSpPr>
+            <a:spLocks noGrp="1"/>
+          </p:cNvSpPr>
+          <p:nvPr>
+            <p:ph type="body" idx="1"/>
+          </p:nvPr>
+        </p:nvSpPr>
+        <p:spPr/>
+        <p:txBody>
+          <a:bodyPr/>
+          <a:lstStyle/>
+          <a:p>
+            <a:pPr rtl="0"/>
+            <a:endParaRPr lang="pl-PL" dirty="0">
+              <a:effectLst/>
+            </a:endParaRPr>
+          </a:p>
+        </p:txBody>
+      </p:sp>
+      <p:sp>
+        <p:nvSpPr>
+          <p:cNvPr id="4" name="Slide Number Placeholder 3"/>
+          <p:cNvSpPr>
+            <a:spLocks noGrp="1"/>
+          </p:cNvSpPr>
+          <p:nvPr>
+            <p:ph type="sldNum" sz="quarter" idx="10"/>
+          </p:nvPr>
+        </p:nvSpPr>
+        <p:spPr/>
+        <p:txBody>
+          <a:bodyPr/>
+          <a:lstStyle/>
+          <a:p>
+            <a:fld id="{79CE77F9-1A7F-B148-A0AA-5828300D10BC}" type="slidenum">
+              <a:rPr lang="pl-PL" smtClean="0"/>
+              <a:t>14</a:t>
+            </a:fld>
+            <a:endParaRPr lang="pl-PL"/>
+          </a:p>
+        </p:txBody>
+      </p:sp>
+    </p:spTree>
+    <p:extLst>
+      <p:ext uri="{BB962C8B-B14F-4D97-AF65-F5344CB8AC3E}">
+        <p14:creationId xmlns:p14="http://schemas.microsoft.com/office/powerpoint/2010/main" val="3946396536"/>
+      </p:ext>
+    </p:extLst>
+  </p:cSld>
+  <p:clrMapOvr>
+    <a:masterClrMapping/>
+  </p:clrMapOvr>
+</p:notes>
+</file>
+
+<file path=ppt/notesSlides/notesSlide15.xml><?xml version="1.0" encoding="utf-8"?>
+<p:notes xmlns:a="http://schemas.openxmlformats.org/drawingml/2006/main" xmlns:r="http://schemas.openxmlformats.org/officeDocument/2006/relationships" xmlns:p="http://schemas.openxmlformats.org/presentationml/2006/main">
+  <p:cSld>
+    <p:spTree>
+      <p:nvGrpSpPr>
+        <p:cNvPr id="1" name=""/>
+        <p:cNvGrpSpPr/>
+        <p:nvPr/>
+      </p:nvGrpSpPr>
+      <p:grpSpPr>
+        <a:xfrm>
+          <a:off x="0" y="0"/>
+          <a:ext cx="0" cy="0"/>
+          <a:chOff x="0" y="0"/>
+          <a:chExt cx="0" cy="0"/>
+        </a:xfrm>
+      </p:grpSpPr>
+      <p:sp>
+        <p:nvSpPr>
+          <p:cNvPr id="2" name="Slide Image Placeholder 1"/>
+          <p:cNvSpPr>
+            <a:spLocks noGrp="1" noRot="1" noChangeAspect="1"/>
+          </p:cNvSpPr>
+          <p:nvPr>
+            <p:ph type="sldImg"/>
+          </p:nvPr>
+        </p:nvSpPr>
+        <p:spPr/>
+      </p:sp>
+      <p:sp>
+        <p:nvSpPr>
+          <p:cNvPr id="3" name="Notes Placeholder 2"/>
+          <p:cNvSpPr>
+            <a:spLocks noGrp="1"/>
+          </p:cNvSpPr>
+          <p:nvPr>
+            <p:ph type="body" idx="1"/>
+          </p:nvPr>
+        </p:nvSpPr>
+        <p:spPr/>
+        <p:txBody>
+          <a:bodyPr/>
+          <a:lstStyle/>
+          <a:p>
+            <a:pPr rtl="0"/>
+            <a:endParaRPr lang="pl-PL" dirty="0">
+              <a:effectLst/>
+            </a:endParaRPr>
+          </a:p>
+        </p:txBody>
+      </p:sp>
+      <p:sp>
+        <p:nvSpPr>
+          <p:cNvPr id="4" name="Slide Number Placeholder 3"/>
+          <p:cNvSpPr>
+            <a:spLocks noGrp="1"/>
+          </p:cNvSpPr>
+          <p:nvPr>
+            <p:ph type="sldNum" sz="quarter" idx="10"/>
+          </p:nvPr>
+        </p:nvSpPr>
+        <p:spPr/>
+        <p:txBody>
+          <a:bodyPr/>
+          <a:lstStyle/>
+          <a:p>
+            <a:fld id="{79CE77F9-1A7F-B148-A0AA-5828300D10BC}" type="slidenum">
+              <a:rPr lang="pl-PL" smtClean="0"/>
+              <a:t>15</a:t>
+            </a:fld>
+            <a:endParaRPr lang="pl-PL"/>
+          </a:p>
+        </p:txBody>
+      </p:sp>
+    </p:spTree>
+    <p:extLst>
+      <p:ext uri="{BB962C8B-B14F-4D97-AF65-F5344CB8AC3E}">
+        <p14:creationId xmlns:p14="http://schemas.microsoft.com/office/powerpoint/2010/main" val="2033852360"/>
+      </p:ext>
+    </p:extLst>
+  </p:cSld>
+  <p:clrMapOvr>
+    <a:masterClrMapping/>
+  </p:clrMapOvr>
+</p:notes>
+</file>
+
+<file path=ppt/notesSlides/notesSlide16.xml><?xml version="1.0" encoding="utf-8"?>
+<p:notes xmlns:a="http://schemas.openxmlformats.org/drawingml/2006/main" xmlns:r="http://schemas.openxmlformats.org/officeDocument/2006/relationships" xmlns:p="http://schemas.openxmlformats.org/presentationml/2006/main">
+  <p:cSld>
+    <p:spTree>
+      <p:nvGrpSpPr>
+        <p:cNvPr id="1" name=""/>
+        <p:cNvGrpSpPr/>
+        <p:nvPr/>
+      </p:nvGrpSpPr>
+      <p:grpSpPr>
+        <a:xfrm>
+          <a:off x="0" y="0"/>
+          <a:ext cx="0" cy="0"/>
+          <a:chOff x="0" y="0"/>
+          <a:chExt cx="0" cy="0"/>
+        </a:xfrm>
+      </p:grpSpPr>
+      <p:sp>
+        <p:nvSpPr>
+          <p:cNvPr id="2" name="Slide Image Placeholder 1"/>
+          <p:cNvSpPr>
+            <a:spLocks noGrp="1" noRot="1" noChangeAspect="1"/>
+          </p:cNvSpPr>
+          <p:nvPr>
+            <p:ph type="sldImg"/>
+          </p:nvPr>
+        </p:nvSpPr>
+        <p:spPr/>
+      </p:sp>
+      <p:sp>
+        <p:nvSpPr>
+          <p:cNvPr id="3" name="Notes Placeholder 2"/>
+          <p:cNvSpPr>
+            <a:spLocks noGrp="1"/>
+          </p:cNvSpPr>
+          <p:nvPr>
+            <p:ph type="body" idx="1"/>
+          </p:nvPr>
+        </p:nvSpPr>
+        <p:spPr/>
+        <p:txBody>
+          <a:bodyPr/>
+          <a:lstStyle/>
+          <a:p>
+            <a:pPr rtl="0"/>
+            <a:endParaRPr lang="pl-PL" dirty="0">
+              <a:effectLst/>
+            </a:endParaRPr>
+          </a:p>
+        </p:txBody>
+      </p:sp>
+      <p:sp>
+        <p:nvSpPr>
+          <p:cNvPr id="4" name="Slide Number Placeholder 3"/>
+          <p:cNvSpPr>
+            <a:spLocks noGrp="1"/>
+          </p:cNvSpPr>
+          <p:nvPr>
+            <p:ph type="sldNum" sz="quarter" idx="10"/>
+          </p:nvPr>
+        </p:nvSpPr>
+        <p:spPr/>
+        <p:txBody>
+          <a:bodyPr/>
+          <a:lstStyle/>
+          <a:p>
+            <a:fld id="{79CE77F9-1A7F-B148-A0AA-5828300D10BC}" type="slidenum">
+              <a:rPr lang="pl-PL" smtClean="0"/>
+              <a:t>16</a:t>
+            </a:fld>
+            <a:endParaRPr lang="pl-PL"/>
+          </a:p>
+        </p:txBody>
+      </p:sp>
+    </p:spTree>
+    <p:extLst>
+      <p:ext uri="{BB962C8B-B14F-4D97-AF65-F5344CB8AC3E}">
+        <p14:creationId xmlns:p14="http://schemas.microsoft.com/office/powerpoint/2010/main" val="1179079117"/>
+      </p:ext>
+    </p:extLst>
+  </p:cSld>
+  <p:clrMapOvr>
+    <a:masterClrMapping/>
+  </p:clrMapOvr>
+</p:notes>
+</file>
+
+<file path=ppt/notesSlides/notesSlide17.xml><?xml version="1.0" encoding="utf-8"?>
+<p:notes xmlns:a="http://schemas.openxmlformats.org/drawingml/2006/main" xmlns:r="http://schemas.openxmlformats.org/officeDocument/2006/relationships" xmlns:p="http://schemas.openxmlformats.org/presentationml/2006/main">
+  <p:cSld>
+    <p:spTree>
+      <p:nvGrpSpPr>
+        <p:cNvPr id="1" name=""/>
+        <p:cNvGrpSpPr/>
+        <p:nvPr/>
+      </p:nvGrpSpPr>
+      <p:grpSpPr>
+        <a:xfrm>
+          <a:off x="0" y="0"/>
+          <a:ext cx="0" cy="0"/>
+          <a:chOff x="0" y="0"/>
+          <a:chExt cx="0" cy="0"/>
+        </a:xfrm>
+      </p:grpSpPr>
+      <p:sp>
+        <p:nvSpPr>
+          <p:cNvPr id="2" name="Slide Image Placeholder 1"/>
+          <p:cNvSpPr>
+            <a:spLocks noGrp="1" noRot="1" noChangeAspect="1"/>
+          </p:cNvSpPr>
+          <p:nvPr>
+            <p:ph type="sldImg"/>
+          </p:nvPr>
+        </p:nvSpPr>
+        <p:spPr/>
+      </p:sp>
+      <p:sp>
+        <p:nvSpPr>
+          <p:cNvPr id="3" name="Notes Placeholder 2"/>
+          <p:cNvSpPr>
+            <a:spLocks noGrp="1"/>
+          </p:cNvSpPr>
+          <p:nvPr>
+            <p:ph type="body" idx="1"/>
+          </p:nvPr>
+        </p:nvSpPr>
+        <p:spPr/>
+        <p:txBody>
+          <a:bodyPr/>
+          <a:lstStyle/>
+          <a:p>
+            <a:pPr rtl="0"/>
+            <a:endParaRPr lang="pl-PL" dirty="0">
+              <a:effectLst/>
+            </a:endParaRPr>
+          </a:p>
+        </p:txBody>
+      </p:sp>
+      <p:sp>
+        <p:nvSpPr>
+          <p:cNvPr id="4" name="Slide Number Placeholder 3"/>
+          <p:cNvSpPr>
+            <a:spLocks noGrp="1"/>
+          </p:cNvSpPr>
+          <p:nvPr>
+            <p:ph type="sldNum" sz="quarter" idx="10"/>
+          </p:nvPr>
+        </p:nvSpPr>
+        <p:spPr/>
+        <p:txBody>
+          <a:bodyPr/>
+          <a:lstStyle/>
+          <a:p>
+            <a:fld id="{79CE77F9-1A7F-B148-A0AA-5828300D10BC}" type="slidenum">
+              <a:rPr lang="pl-PL" smtClean="0"/>
+              <a:t>17</a:t>
+            </a:fld>
+            <a:endParaRPr lang="pl-PL"/>
+          </a:p>
+        </p:txBody>
+      </p:sp>
+    </p:spTree>
+    <p:extLst>
+      <p:ext uri="{BB962C8B-B14F-4D97-AF65-F5344CB8AC3E}">
+        <p14:creationId xmlns:p14="http://schemas.microsoft.com/office/powerpoint/2010/main" val="662527330"/>
+      </p:ext>
+    </p:extLst>
+  </p:cSld>
+  <p:clrMapOvr>
+    <a:masterClrMapping/>
+  </p:clrMapOvr>
+</p:notes>
+</file>
+
 <file path=ppt/notesSlides/notesSlide2.xml><?xml version="1.0" encoding="utf-8"?>
 <p:notes xmlns:a="http://schemas.openxmlformats.org/drawingml/2006/main" xmlns:r="http://schemas.openxmlformats.org/officeDocument/2006/relationships" xmlns:p="http://schemas.openxmlformats.org/presentationml/2006/main">
   <p:cSld>
@@ -1230,6 +1937,267 @@
 </p:notes>
 </file>
 
+<file path=ppt/notesSlides/notesSlide7.xml><?xml version="1.0" encoding="utf-8"?>
+<p:notes xmlns:a="http://schemas.openxmlformats.org/drawingml/2006/main" xmlns:r="http://schemas.openxmlformats.org/officeDocument/2006/relationships" xmlns:p="http://schemas.openxmlformats.org/presentationml/2006/main">
+  <p:cSld>
+    <p:spTree>
+      <p:nvGrpSpPr>
+        <p:cNvPr id="1" name=""/>
+        <p:cNvGrpSpPr/>
+        <p:nvPr/>
+      </p:nvGrpSpPr>
+      <p:grpSpPr>
+        <a:xfrm>
+          <a:off x="0" y="0"/>
+          <a:ext cx="0" cy="0"/>
+          <a:chOff x="0" y="0"/>
+          <a:chExt cx="0" cy="0"/>
+        </a:xfrm>
+      </p:grpSpPr>
+      <p:sp>
+        <p:nvSpPr>
+          <p:cNvPr id="2" name="Slide Image Placeholder 1"/>
+          <p:cNvSpPr>
+            <a:spLocks noGrp="1" noRot="1" noChangeAspect="1"/>
+          </p:cNvSpPr>
+          <p:nvPr>
+            <p:ph type="sldImg"/>
+          </p:nvPr>
+        </p:nvSpPr>
+        <p:spPr/>
+      </p:sp>
+      <p:sp>
+        <p:nvSpPr>
+          <p:cNvPr id="3" name="Notes Placeholder 2"/>
+          <p:cNvSpPr>
+            <a:spLocks noGrp="1"/>
+          </p:cNvSpPr>
+          <p:nvPr>
+            <p:ph type="body" idx="1"/>
+          </p:nvPr>
+        </p:nvSpPr>
+        <p:spPr/>
+        <p:txBody>
+          <a:bodyPr/>
+          <a:lstStyle/>
+          <a:p>
+            <a:pPr rtl="0"/>
+            <a:endParaRPr lang="pl-PL" dirty="0">
+              <a:effectLst/>
+            </a:endParaRPr>
+          </a:p>
+        </p:txBody>
+      </p:sp>
+      <p:sp>
+        <p:nvSpPr>
+          <p:cNvPr id="4" name="Slide Number Placeholder 3"/>
+          <p:cNvSpPr>
+            <a:spLocks noGrp="1"/>
+          </p:cNvSpPr>
+          <p:nvPr>
+            <p:ph type="sldNum" sz="quarter" idx="10"/>
+          </p:nvPr>
+        </p:nvSpPr>
+        <p:spPr/>
+        <p:txBody>
+          <a:bodyPr/>
+          <a:lstStyle/>
+          <a:p>
+            <a:fld id="{79CE77F9-1A7F-B148-A0AA-5828300D10BC}" type="slidenum">
+              <a:rPr lang="pl-PL" smtClean="0"/>
+              <a:t>7</a:t>
+            </a:fld>
+            <a:endParaRPr lang="pl-PL"/>
+          </a:p>
+        </p:txBody>
+      </p:sp>
+    </p:spTree>
+    <p:extLst>
+      <p:ext uri="{BB962C8B-B14F-4D97-AF65-F5344CB8AC3E}">
+        <p14:creationId xmlns:p14="http://schemas.microsoft.com/office/powerpoint/2010/main" val="3283827068"/>
+      </p:ext>
+    </p:extLst>
+  </p:cSld>
+  <p:clrMapOvr>
+    <a:masterClrMapping/>
+  </p:clrMapOvr>
+</p:notes>
+</file>
+
+<file path=ppt/notesSlides/notesSlide8.xml><?xml version="1.0" encoding="utf-8"?>
+<p:notes xmlns:a="http://schemas.openxmlformats.org/drawingml/2006/main" xmlns:r="http://schemas.openxmlformats.org/officeDocument/2006/relationships" xmlns:p="http://schemas.openxmlformats.org/presentationml/2006/main">
+  <p:cSld>
+    <p:spTree>
+      <p:nvGrpSpPr>
+        <p:cNvPr id="1" name=""/>
+        <p:cNvGrpSpPr/>
+        <p:nvPr/>
+      </p:nvGrpSpPr>
+      <p:grpSpPr>
+        <a:xfrm>
+          <a:off x="0" y="0"/>
+          <a:ext cx="0" cy="0"/>
+          <a:chOff x="0" y="0"/>
+          <a:chExt cx="0" cy="0"/>
+        </a:xfrm>
+      </p:grpSpPr>
+      <p:sp>
+        <p:nvSpPr>
+          <p:cNvPr id="2" name="Slide Image Placeholder 1"/>
+          <p:cNvSpPr>
+            <a:spLocks noGrp="1" noRot="1" noChangeAspect="1"/>
+          </p:cNvSpPr>
+          <p:nvPr>
+            <p:ph type="sldImg"/>
+          </p:nvPr>
+        </p:nvSpPr>
+        <p:spPr/>
+      </p:sp>
+      <p:sp>
+        <p:nvSpPr>
+          <p:cNvPr id="3" name="Notes Placeholder 2"/>
+          <p:cNvSpPr>
+            <a:spLocks noGrp="1"/>
+          </p:cNvSpPr>
+          <p:nvPr>
+            <p:ph type="body" idx="1"/>
+          </p:nvPr>
+        </p:nvSpPr>
+        <p:spPr/>
+        <p:txBody>
+          <a:bodyPr/>
+          <a:lstStyle/>
+          <a:p>
+            <a:pPr rtl="0"/>
+            <a:endParaRPr lang="pl-PL" dirty="0">
+              <a:effectLst/>
+            </a:endParaRPr>
+          </a:p>
+        </p:txBody>
+      </p:sp>
+      <p:sp>
+        <p:nvSpPr>
+          <p:cNvPr id="4" name="Slide Number Placeholder 3"/>
+          <p:cNvSpPr>
+            <a:spLocks noGrp="1"/>
+          </p:cNvSpPr>
+          <p:nvPr>
+            <p:ph type="sldNum" sz="quarter" idx="10"/>
+          </p:nvPr>
+        </p:nvSpPr>
+        <p:spPr/>
+        <p:txBody>
+          <a:bodyPr/>
+          <a:lstStyle/>
+          <a:p>
+            <a:fld id="{79CE77F9-1A7F-B148-A0AA-5828300D10BC}" type="slidenum">
+              <a:rPr lang="pl-PL" smtClean="0"/>
+              <a:t>8</a:t>
+            </a:fld>
+            <a:endParaRPr lang="pl-PL"/>
+          </a:p>
+        </p:txBody>
+      </p:sp>
+    </p:spTree>
+    <p:extLst>
+      <p:ext uri="{BB962C8B-B14F-4D97-AF65-F5344CB8AC3E}">
+        <p14:creationId xmlns:p14="http://schemas.microsoft.com/office/powerpoint/2010/main" val="2037939550"/>
+      </p:ext>
+    </p:extLst>
+  </p:cSld>
+  <p:clrMapOvr>
+    <a:masterClrMapping/>
+  </p:clrMapOvr>
+</p:notes>
+</file>
+
+<file path=ppt/notesSlides/notesSlide9.xml><?xml version="1.0" encoding="utf-8"?>
+<p:notes xmlns:a="http://schemas.openxmlformats.org/drawingml/2006/main" xmlns:r="http://schemas.openxmlformats.org/officeDocument/2006/relationships" xmlns:p="http://schemas.openxmlformats.org/presentationml/2006/main">
+  <p:cSld>
+    <p:spTree>
+      <p:nvGrpSpPr>
+        <p:cNvPr id="1" name=""/>
+        <p:cNvGrpSpPr/>
+        <p:nvPr/>
+      </p:nvGrpSpPr>
+      <p:grpSpPr>
+        <a:xfrm>
+          <a:off x="0" y="0"/>
+          <a:ext cx="0" cy="0"/>
+          <a:chOff x="0" y="0"/>
+          <a:chExt cx="0" cy="0"/>
+        </a:xfrm>
+      </p:grpSpPr>
+      <p:sp>
+        <p:nvSpPr>
+          <p:cNvPr id="2" name="Slide Image Placeholder 1"/>
+          <p:cNvSpPr>
+            <a:spLocks noGrp="1" noRot="1" noChangeAspect="1"/>
+          </p:cNvSpPr>
+          <p:nvPr>
+            <p:ph type="sldImg"/>
+          </p:nvPr>
+        </p:nvSpPr>
+        <p:spPr/>
+      </p:sp>
+      <p:sp>
+        <p:nvSpPr>
+          <p:cNvPr id="3" name="Notes Placeholder 2"/>
+          <p:cNvSpPr>
+            <a:spLocks noGrp="1"/>
+          </p:cNvSpPr>
+          <p:nvPr>
+            <p:ph type="body" idx="1"/>
+          </p:nvPr>
+        </p:nvSpPr>
+        <p:spPr/>
+        <p:txBody>
+          <a:bodyPr/>
+          <a:lstStyle/>
+          <a:p>
+            <a:pPr rtl="0"/>
+            <a:endParaRPr lang="pl-PL" dirty="0">
+              <a:effectLst/>
+            </a:endParaRPr>
+          </a:p>
+        </p:txBody>
+      </p:sp>
+      <p:sp>
+        <p:nvSpPr>
+          <p:cNvPr id="4" name="Slide Number Placeholder 3"/>
+          <p:cNvSpPr>
+            <a:spLocks noGrp="1"/>
+          </p:cNvSpPr>
+          <p:nvPr>
+            <p:ph type="sldNum" sz="quarter" idx="10"/>
+          </p:nvPr>
+        </p:nvSpPr>
+        <p:spPr/>
+        <p:txBody>
+          <a:bodyPr/>
+          <a:lstStyle/>
+          <a:p>
+            <a:fld id="{79CE77F9-1A7F-B148-A0AA-5828300D10BC}" type="slidenum">
+              <a:rPr lang="pl-PL" smtClean="0"/>
+              <a:t>9</a:t>
+            </a:fld>
+            <a:endParaRPr lang="pl-PL"/>
+          </a:p>
+        </p:txBody>
+      </p:sp>
+    </p:spTree>
+    <p:extLst>
+      <p:ext uri="{BB962C8B-B14F-4D97-AF65-F5344CB8AC3E}">
+        <p14:creationId xmlns:p14="http://schemas.microsoft.com/office/powerpoint/2010/main" val="3473981838"/>
+      </p:ext>
+    </p:extLst>
+  </p:cSld>
+  <p:clrMapOvr>
+    <a:masterClrMapping/>
+  </p:clrMapOvr>
+</p:notes>
+</file>
+
 <file path=ppt/slideLayouts/slideLayout1.xml><?xml version="1.0" encoding="utf-8"?>
 <p:sldLayout xmlns:a="http://schemas.openxmlformats.org/drawingml/2006/main" xmlns:r="http://schemas.openxmlformats.org/officeDocument/2006/relationships" xmlns:p="http://schemas.openxmlformats.org/presentationml/2006/main" type="title" preserve="1">
   <p:cSld name="Slajd tytułowy">
@@ -1409,7 +2377,7 @@
           <a:p>
             <a:fld id="{91017B01-0C30-B241-B19F-621BE4770608}" type="datetimeFigureOut">
               <a:rPr lang="pl-PL" smtClean="0"/>
-              <a:t>12.02.2022</a:t>
+              <a:t>01.03.2022</a:t>
             </a:fld>
             <a:endParaRPr lang="pl-PL"/>
           </a:p>
@@ -1578,7 +2546,7 @@
           <a:p>
             <a:fld id="{91017B01-0C30-B241-B19F-621BE4770608}" type="datetimeFigureOut">
               <a:rPr lang="pl-PL" smtClean="0"/>
-              <a:t>12.02.2022</a:t>
+              <a:t>01.03.2022</a:t>
             </a:fld>
             <a:endParaRPr lang="pl-PL"/>
           </a:p>
@@ -1757,7 +2725,7 @@
           <a:p>
             <a:fld id="{91017B01-0C30-B241-B19F-621BE4770608}" type="datetimeFigureOut">
               <a:rPr lang="pl-PL" smtClean="0"/>
-              <a:t>12.02.2022</a:t>
+              <a:t>01.03.2022</a:t>
             </a:fld>
             <a:endParaRPr lang="pl-PL"/>
           </a:p>
@@ -1926,7 +2894,7 @@
           <a:p>
             <a:fld id="{91017B01-0C30-B241-B19F-621BE4770608}" type="datetimeFigureOut">
               <a:rPr lang="pl-PL" smtClean="0"/>
-              <a:t>12.02.2022</a:t>
+              <a:t>01.03.2022</a:t>
             </a:fld>
             <a:endParaRPr lang="pl-PL"/>
           </a:p>
@@ -2172,7 +3140,7 @@
           <a:p>
             <a:fld id="{91017B01-0C30-B241-B19F-621BE4770608}" type="datetimeFigureOut">
               <a:rPr lang="pl-PL" smtClean="0"/>
-              <a:t>12.02.2022</a:t>
+              <a:t>01.03.2022</a:t>
             </a:fld>
             <a:endParaRPr lang="pl-PL"/>
           </a:p>
@@ -2458,7 +3426,7 @@
           <a:p>
             <a:fld id="{91017B01-0C30-B241-B19F-621BE4770608}" type="datetimeFigureOut">
               <a:rPr lang="pl-PL" smtClean="0"/>
-              <a:t>12.02.2022</a:t>
+              <a:t>01.03.2022</a:t>
             </a:fld>
             <a:endParaRPr lang="pl-PL"/>
           </a:p>
@@ -2878,7 +3846,7 @@
           <a:p>
             <a:fld id="{91017B01-0C30-B241-B19F-621BE4770608}" type="datetimeFigureOut">
               <a:rPr lang="pl-PL" smtClean="0"/>
-              <a:t>12.02.2022</a:t>
+              <a:t>01.03.2022</a:t>
             </a:fld>
             <a:endParaRPr lang="pl-PL"/>
           </a:p>
@@ -2996,7 +3964,7 @@
           <a:p>
             <a:fld id="{91017B01-0C30-B241-B19F-621BE4770608}" type="datetimeFigureOut">
               <a:rPr lang="pl-PL" smtClean="0"/>
-              <a:t>12.02.2022</a:t>
+              <a:t>01.03.2022</a:t>
             </a:fld>
             <a:endParaRPr lang="pl-PL"/>
           </a:p>
@@ -3092,7 +4060,7 @@
           <a:p>
             <a:fld id="{91017B01-0C30-B241-B19F-621BE4770608}" type="datetimeFigureOut">
               <a:rPr lang="pl-PL" smtClean="0"/>
-              <a:t>12.02.2022</a:t>
+              <a:t>01.03.2022</a:t>
             </a:fld>
             <a:endParaRPr lang="pl-PL"/>
           </a:p>
@@ -3369,7 +4337,7 @@
           <a:p>
             <a:fld id="{91017B01-0C30-B241-B19F-621BE4770608}" type="datetimeFigureOut">
               <a:rPr lang="pl-PL" smtClean="0"/>
-              <a:t>12.02.2022</a:t>
+              <a:t>01.03.2022</a:t>
             </a:fld>
             <a:endParaRPr lang="pl-PL"/>
           </a:p>
@@ -3625,7 +4593,7 @@
           <a:p>
             <a:fld id="{91017B01-0C30-B241-B19F-621BE4770608}" type="datetimeFigureOut">
               <a:rPr lang="pl-PL" smtClean="0"/>
-              <a:t>12.02.2022</a:t>
+              <a:t>01.03.2022</a:t>
             </a:fld>
             <a:endParaRPr lang="pl-PL"/>
           </a:p>
@@ -3837,7 +4805,7 @@
           <a:p>
             <a:fld id="{91017B01-0C30-B241-B19F-621BE4770608}" type="datetimeFigureOut">
               <a:rPr lang="pl-PL" smtClean="0"/>
-              <a:t>12.02.2022</a:t>
+              <a:t>01.03.2022</a:t>
             </a:fld>
             <a:endParaRPr lang="pl-PL"/>
           </a:p>
@@ -4430,6 +5398,1723 @@
 </p:sld>
 </file>
 
+<file path=ppt/slides/slide10.xml><?xml version="1.0" encoding="utf-8"?>
+<p:sld xmlns:a="http://schemas.openxmlformats.org/drawingml/2006/main" xmlns:r="http://schemas.openxmlformats.org/officeDocument/2006/relationships" xmlns:p="http://schemas.openxmlformats.org/presentationml/2006/main">
+  <p:cSld>
+    <p:bg>
+      <p:bgPr>
+        <a:blipFill dpi="0" rotWithShape="0">
+          <a:blip r:embed="rId3" cstate="print"/>
+          <a:srcRect/>
+          <a:stretch>
+            <a:fillRect/>
+          </a:stretch>
+        </a:blipFill>
+        <a:effectLst/>
+      </p:bgPr>
+    </p:bg>
+    <p:spTree>
+      <p:nvGrpSpPr>
+        <p:cNvPr id="1" name=""/>
+        <p:cNvGrpSpPr/>
+        <p:nvPr/>
+      </p:nvGrpSpPr>
+      <p:grpSpPr>
+        <a:xfrm>
+          <a:off x="0" y="0"/>
+          <a:ext cx="0" cy="0"/>
+          <a:chOff x="0" y="0"/>
+          <a:chExt cx="0" cy="0"/>
+        </a:xfrm>
+      </p:grpSpPr>
+      <p:sp>
+        <p:nvSpPr>
+          <p:cNvPr id="2" name="Rectangle 1"/>
+          <p:cNvSpPr/>
+          <p:nvPr/>
+        </p:nvSpPr>
+        <p:spPr>
+          <a:xfrm>
+            <a:off x="1979712" y="188640"/>
+            <a:ext cx="6696744" cy="492443"/>
+          </a:xfrm>
+          <a:prstGeom prst="rect">
+            <a:avLst/>
+          </a:prstGeom>
+        </p:spPr>
+        <p:txBody>
+          <a:bodyPr wrap="square">
+            <a:spAutoFit/>
+          </a:bodyPr>
+          <a:lstStyle/>
+          <a:p>
+            <a:pPr algn="ctr"/>
+            <a:r>
+              <a:rPr lang="pl-PL" sz="2600" dirty="0">
+                <a:solidFill>
+                  <a:schemeClr val="bg1"/>
+                </a:solidFill>
+                <a:latin typeface="Verdana" panose="020B0604030504040204" pitchFamily="34" charset="0"/>
+                <a:ea typeface="Verdana" panose="020B0604030504040204" pitchFamily="34" charset="0"/>
+                <a:cs typeface="Verdana" panose="020B0604030504040204" pitchFamily="34" charset="0"/>
+              </a:rPr>
+              <a:t>Java</a:t>
+            </a:r>
+          </a:p>
+        </p:txBody>
+      </p:sp>
+      <p:sp>
+        <p:nvSpPr>
+          <p:cNvPr id="6" name="Prostokąt 5">
+            <a:extLst>
+              <a:ext uri="{FF2B5EF4-FFF2-40B4-BE49-F238E27FC236}">
+                <a16:creationId xmlns:a16="http://schemas.microsoft.com/office/drawing/2014/main" id="{CA41B780-B57E-411C-AAD5-3D3D6912F664}"/>
+              </a:ext>
+            </a:extLst>
+          </p:cNvPr>
+          <p:cNvSpPr/>
+          <p:nvPr/>
+        </p:nvSpPr>
+        <p:spPr>
+          <a:xfrm>
+            <a:off x="0" y="836712"/>
+            <a:ext cx="9144000" cy="6021288"/>
+          </a:xfrm>
+          <a:prstGeom prst="rect">
+            <a:avLst/>
+          </a:prstGeom>
+          <a:solidFill>
+            <a:schemeClr val="tx1">
+              <a:lumMod val="75000"/>
+              <a:lumOff val="25000"/>
+            </a:schemeClr>
+          </a:solidFill>
+        </p:spPr>
+        <p:style>
+          <a:lnRef idx="1">
+            <a:schemeClr val="accent1"/>
+          </a:lnRef>
+          <a:fillRef idx="3">
+            <a:schemeClr val="accent1"/>
+          </a:fillRef>
+          <a:effectRef idx="2">
+            <a:schemeClr val="accent1"/>
+          </a:effectRef>
+          <a:fontRef idx="minor">
+            <a:schemeClr val="lt1"/>
+          </a:fontRef>
+        </p:style>
+        <p:txBody>
+          <a:bodyPr rtlCol="0" anchor="ctr"/>
+          <a:lstStyle/>
+          <a:p>
+            <a:pPr algn="ctr"/>
+            <a:endParaRPr lang="pl-PL"/>
+          </a:p>
+        </p:txBody>
+      </p:sp>
+      <p:pic>
+        <p:nvPicPr>
+          <p:cNvPr id="1026" name="Picture 2" descr="Oracle to End Free Support for Past Java Versions Much Sooner">
+            <a:extLst>
+              <a:ext uri="{FF2B5EF4-FFF2-40B4-BE49-F238E27FC236}">
+                <a16:creationId xmlns:a16="http://schemas.microsoft.com/office/drawing/2014/main" id="{19E9AD44-3AE8-495F-9484-108644CBF6B7}"/>
+              </a:ext>
+            </a:extLst>
+          </p:cNvPr>
+          <p:cNvPicPr>
+            <a:picLocks noChangeAspect="1" noChangeArrowheads="1"/>
+          </p:cNvPicPr>
+          <p:nvPr/>
+        </p:nvPicPr>
+        <p:blipFill>
+          <a:blip r:embed="rId4">
+            <a:extLst>
+              <a:ext uri="{28A0092B-C50C-407E-A947-70E740481C1C}">
+                <a14:useLocalDpi xmlns:a14="http://schemas.microsoft.com/office/drawing/2010/main" val="0"/>
+              </a:ext>
+            </a:extLst>
+          </a:blip>
+          <a:srcRect/>
+          <a:stretch>
+            <a:fillRect/>
+          </a:stretch>
+        </p:blipFill>
+        <p:spPr bwMode="auto">
+          <a:xfrm>
+            <a:off x="4986" y="797768"/>
+            <a:ext cx="9144000" cy="6099175"/>
+          </a:xfrm>
+          <a:prstGeom prst="rect">
+            <a:avLst/>
+          </a:prstGeom>
+          <a:noFill/>
+          <a:extLst>
+            <a:ext uri="{909E8E84-426E-40DD-AFC4-6F175D3DCCD1}">
+              <a14:hiddenFill xmlns:a14="http://schemas.microsoft.com/office/drawing/2010/main">
+                <a:solidFill>
+                  <a:srgbClr val="FFFFFF"/>
+                </a:solidFill>
+              </a14:hiddenFill>
+            </a:ext>
+          </a:extLst>
+        </p:spPr>
+      </p:pic>
+    </p:spTree>
+    <p:extLst>
+      <p:ext uri="{BB962C8B-B14F-4D97-AF65-F5344CB8AC3E}">
+        <p14:creationId xmlns:p14="http://schemas.microsoft.com/office/powerpoint/2010/main" val="2208739178"/>
+      </p:ext>
+    </p:extLst>
+  </p:cSld>
+  <p:clrMapOvr>
+    <a:masterClrMapping/>
+  </p:clrMapOvr>
+</p:sld>
+</file>
+
+<file path=ppt/slides/slide11.xml><?xml version="1.0" encoding="utf-8"?>
+<p:sld xmlns:a="http://schemas.openxmlformats.org/drawingml/2006/main" xmlns:r="http://schemas.openxmlformats.org/officeDocument/2006/relationships" xmlns:p="http://schemas.openxmlformats.org/presentationml/2006/main">
+  <p:cSld>
+    <p:bg>
+      <p:bgPr>
+        <a:blipFill dpi="0" rotWithShape="0">
+          <a:blip r:embed="rId3" cstate="print"/>
+          <a:srcRect/>
+          <a:stretch>
+            <a:fillRect/>
+          </a:stretch>
+        </a:blipFill>
+        <a:effectLst/>
+      </p:bgPr>
+    </p:bg>
+    <p:spTree>
+      <p:nvGrpSpPr>
+        <p:cNvPr id="1" name=""/>
+        <p:cNvGrpSpPr/>
+        <p:nvPr/>
+      </p:nvGrpSpPr>
+      <p:grpSpPr>
+        <a:xfrm>
+          <a:off x="0" y="0"/>
+          <a:ext cx="0" cy="0"/>
+          <a:chOff x="0" y="0"/>
+          <a:chExt cx="0" cy="0"/>
+        </a:xfrm>
+      </p:grpSpPr>
+      <p:sp>
+        <p:nvSpPr>
+          <p:cNvPr id="2" name="Rectangle 1"/>
+          <p:cNvSpPr/>
+          <p:nvPr/>
+        </p:nvSpPr>
+        <p:spPr>
+          <a:xfrm>
+            <a:off x="1979712" y="188640"/>
+            <a:ext cx="6696744" cy="492443"/>
+          </a:xfrm>
+          <a:prstGeom prst="rect">
+            <a:avLst/>
+          </a:prstGeom>
+        </p:spPr>
+        <p:txBody>
+          <a:bodyPr wrap="square">
+            <a:spAutoFit/>
+          </a:bodyPr>
+          <a:lstStyle/>
+          <a:p>
+            <a:pPr algn="ctr"/>
+            <a:r>
+              <a:rPr lang="pl-PL" sz="2600" dirty="0">
+                <a:solidFill>
+                  <a:schemeClr val="bg1"/>
+                </a:solidFill>
+                <a:latin typeface="Verdana" panose="020B0604030504040204" pitchFamily="34" charset="0"/>
+                <a:ea typeface="Verdana" panose="020B0604030504040204" pitchFamily="34" charset="0"/>
+                <a:cs typeface="Verdana" panose="020B0604030504040204" pitchFamily="34" charset="0"/>
+              </a:rPr>
+              <a:t>Java</a:t>
+            </a:r>
+          </a:p>
+        </p:txBody>
+      </p:sp>
+      <p:sp>
+        <p:nvSpPr>
+          <p:cNvPr id="6" name="Prostokąt 5">
+            <a:extLst>
+              <a:ext uri="{FF2B5EF4-FFF2-40B4-BE49-F238E27FC236}">
+                <a16:creationId xmlns:a16="http://schemas.microsoft.com/office/drawing/2014/main" id="{CA41B780-B57E-411C-AAD5-3D3D6912F664}"/>
+              </a:ext>
+            </a:extLst>
+          </p:cNvPr>
+          <p:cNvSpPr/>
+          <p:nvPr/>
+        </p:nvSpPr>
+        <p:spPr>
+          <a:xfrm>
+            <a:off x="0" y="836712"/>
+            <a:ext cx="9144000" cy="6021288"/>
+          </a:xfrm>
+          <a:prstGeom prst="rect">
+            <a:avLst/>
+          </a:prstGeom>
+          <a:solidFill>
+            <a:schemeClr val="tx1">
+              <a:lumMod val="75000"/>
+              <a:lumOff val="25000"/>
+            </a:schemeClr>
+          </a:solidFill>
+        </p:spPr>
+        <p:style>
+          <a:lnRef idx="1">
+            <a:schemeClr val="accent1"/>
+          </a:lnRef>
+          <a:fillRef idx="3">
+            <a:schemeClr val="accent1"/>
+          </a:fillRef>
+          <a:effectRef idx="2">
+            <a:schemeClr val="accent1"/>
+          </a:effectRef>
+          <a:fontRef idx="minor">
+            <a:schemeClr val="lt1"/>
+          </a:fontRef>
+        </p:style>
+        <p:txBody>
+          <a:bodyPr rtlCol="0" anchor="ctr"/>
+          <a:lstStyle/>
+          <a:p>
+            <a:pPr algn="ctr"/>
+            <a:endParaRPr lang="pl-PL"/>
+          </a:p>
+        </p:txBody>
+      </p:sp>
+      <p:pic>
+        <p:nvPicPr>
+          <p:cNvPr id="4" name="Obraz 3">
+            <a:extLst>
+              <a:ext uri="{FF2B5EF4-FFF2-40B4-BE49-F238E27FC236}">
+                <a16:creationId xmlns:a16="http://schemas.microsoft.com/office/drawing/2014/main" id="{14514CBD-97C8-45DA-986F-ECFA172B56B9}"/>
+              </a:ext>
+            </a:extLst>
+          </p:cNvPr>
+          <p:cNvPicPr>
+            <a:picLocks noChangeAspect="1"/>
+          </p:cNvPicPr>
+          <p:nvPr/>
+        </p:nvPicPr>
+        <p:blipFill>
+          <a:blip r:embed="rId4"/>
+          <a:stretch>
+            <a:fillRect/>
+          </a:stretch>
+        </p:blipFill>
+        <p:spPr>
+          <a:xfrm>
+            <a:off x="614483" y="1043269"/>
+            <a:ext cx="7915033" cy="5626091"/>
+          </a:xfrm>
+          <a:prstGeom prst="rect">
+            <a:avLst/>
+          </a:prstGeom>
+        </p:spPr>
+      </p:pic>
+    </p:spTree>
+    <p:extLst>
+      <p:ext uri="{BB962C8B-B14F-4D97-AF65-F5344CB8AC3E}">
+        <p14:creationId xmlns:p14="http://schemas.microsoft.com/office/powerpoint/2010/main" val="1288374539"/>
+      </p:ext>
+    </p:extLst>
+  </p:cSld>
+  <p:clrMapOvr>
+    <a:masterClrMapping/>
+  </p:clrMapOvr>
+</p:sld>
+</file>
+
+<file path=ppt/slides/slide12.xml><?xml version="1.0" encoding="utf-8"?>
+<p:sld xmlns:a="http://schemas.openxmlformats.org/drawingml/2006/main" xmlns:r="http://schemas.openxmlformats.org/officeDocument/2006/relationships" xmlns:p="http://schemas.openxmlformats.org/presentationml/2006/main">
+  <p:cSld>
+    <p:bg>
+      <p:bgPr>
+        <a:blipFill dpi="0" rotWithShape="0">
+          <a:blip r:embed="rId3" cstate="print"/>
+          <a:srcRect/>
+          <a:stretch>
+            <a:fillRect/>
+          </a:stretch>
+        </a:blipFill>
+        <a:effectLst/>
+      </p:bgPr>
+    </p:bg>
+    <p:spTree>
+      <p:nvGrpSpPr>
+        <p:cNvPr id="1" name=""/>
+        <p:cNvGrpSpPr/>
+        <p:nvPr/>
+      </p:nvGrpSpPr>
+      <p:grpSpPr>
+        <a:xfrm>
+          <a:off x="0" y="0"/>
+          <a:ext cx="0" cy="0"/>
+          <a:chOff x="0" y="0"/>
+          <a:chExt cx="0" cy="0"/>
+        </a:xfrm>
+      </p:grpSpPr>
+      <p:sp>
+        <p:nvSpPr>
+          <p:cNvPr id="2" name="Rectangle 1"/>
+          <p:cNvSpPr/>
+          <p:nvPr/>
+        </p:nvSpPr>
+        <p:spPr>
+          <a:xfrm>
+            <a:off x="1979712" y="188640"/>
+            <a:ext cx="6696744" cy="492443"/>
+          </a:xfrm>
+          <a:prstGeom prst="rect">
+            <a:avLst/>
+          </a:prstGeom>
+        </p:spPr>
+        <p:txBody>
+          <a:bodyPr wrap="square">
+            <a:spAutoFit/>
+          </a:bodyPr>
+          <a:lstStyle/>
+          <a:p>
+            <a:pPr algn="ctr"/>
+            <a:r>
+              <a:rPr lang="pl-PL" sz="2600" dirty="0">
+                <a:solidFill>
+                  <a:schemeClr val="bg1"/>
+                </a:solidFill>
+                <a:latin typeface="Verdana" panose="020B0604030504040204" pitchFamily="34" charset="0"/>
+                <a:ea typeface="Verdana" panose="020B0604030504040204" pitchFamily="34" charset="0"/>
+                <a:cs typeface="Verdana" panose="020B0604030504040204" pitchFamily="34" charset="0"/>
+              </a:rPr>
+              <a:t>Java</a:t>
+            </a:r>
+          </a:p>
+        </p:txBody>
+      </p:sp>
+      <p:sp>
+        <p:nvSpPr>
+          <p:cNvPr id="6" name="Prostokąt 5">
+            <a:extLst>
+              <a:ext uri="{FF2B5EF4-FFF2-40B4-BE49-F238E27FC236}">
+                <a16:creationId xmlns:a16="http://schemas.microsoft.com/office/drawing/2014/main" id="{CA41B780-B57E-411C-AAD5-3D3D6912F664}"/>
+              </a:ext>
+            </a:extLst>
+          </p:cNvPr>
+          <p:cNvSpPr/>
+          <p:nvPr/>
+        </p:nvSpPr>
+        <p:spPr>
+          <a:xfrm>
+            <a:off x="0" y="836712"/>
+            <a:ext cx="9144000" cy="6021288"/>
+          </a:xfrm>
+          <a:prstGeom prst="rect">
+            <a:avLst/>
+          </a:prstGeom>
+          <a:solidFill>
+            <a:schemeClr val="tx1">
+              <a:lumMod val="75000"/>
+              <a:lumOff val="25000"/>
+            </a:schemeClr>
+          </a:solidFill>
+        </p:spPr>
+        <p:style>
+          <a:lnRef idx="1">
+            <a:schemeClr val="accent1"/>
+          </a:lnRef>
+          <a:fillRef idx="3">
+            <a:schemeClr val="accent1"/>
+          </a:fillRef>
+          <a:effectRef idx="2">
+            <a:schemeClr val="accent1"/>
+          </a:effectRef>
+          <a:fontRef idx="minor">
+            <a:schemeClr val="lt1"/>
+          </a:fontRef>
+        </p:style>
+        <p:txBody>
+          <a:bodyPr rtlCol="0" anchor="ctr"/>
+          <a:lstStyle/>
+          <a:p>
+            <a:pPr algn="ctr"/>
+            <a:endParaRPr lang="pl-PL"/>
+          </a:p>
+        </p:txBody>
+      </p:sp>
+      <p:pic>
+        <p:nvPicPr>
+          <p:cNvPr id="5" name="Obraz 4">
+            <a:extLst>
+              <a:ext uri="{FF2B5EF4-FFF2-40B4-BE49-F238E27FC236}">
+                <a16:creationId xmlns:a16="http://schemas.microsoft.com/office/drawing/2014/main" id="{9A438FA4-F520-4CD9-A5D0-99B292CECA88}"/>
+              </a:ext>
+            </a:extLst>
+          </p:cNvPr>
+          <p:cNvPicPr>
+            <a:picLocks noChangeAspect="1"/>
+          </p:cNvPicPr>
+          <p:nvPr/>
+        </p:nvPicPr>
+        <p:blipFill>
+          <a:blip r:embed="rId4"/>
+          <a:stretch>
+            <a:fillRect/>
+          </a:stretch>
+        </p:blipFill>
+        <p:spPr>
+          <a:xfrm>
+            <a:off x="442405" y="885337"/>
+            <a:ext cx="8259189" cy="5806645"/>
+          </a:xfrm>
+          <a:prstGeom prst="rect">
+            <a:avLst/>
+          </a:prstGeom>
+        </p:spPr>
+      </p:pic>
+    </p:spTree>
+    <p:extLst>
+      <p:ext uri="{BB962C8B-B14F-4D97-AF65-F5344CB8AC3E}">
+        <p14:creationId xmlns:p14="http://schemas.microsoft.com/office/powerpoint/2010/main" val="415097213"/>
+      </p:ext>
+    </p:extLst>
+  </p:cSld>
+  <p:clrMapOvr>
+    <a:masterClrMapping/>
+  </p:clrMapOvr>
+</p:sld>
+</file>
+
+<file path=ppt/slides/slide13.xml><?xml version="1.0" encoding="utf-8"?>
+<p:sld xmlns:a="http://schemas.openxmlformats.org/drawingml/2006/main" xmlns:r="http://schemas.openxmlformats.org/officeDocument/2006/relationships" xmlns:p="http://schemas.openxmlformats.org/presentationml/2006/main">
+  <p:cSld>
+    <p:bg>
+      <p:bgPr>
+        <a:blipFill dpi="0" rotWithShape="0">
+          <a:blip r:embed="rId3" cstate="print"/>
+          <a:srcRect/>
+          <a:stretch>
+            <a:fillRect/>
+          </a:stretch>
+        </a:blipFill>
+        <a:effectLst/>
+      </p:bgPr>
+    </p:bg>
+    <p:spTree>
+      <p:nvGrpSpPr>
+        <p:cNvPr id="1" name=""/>
+        <p:cNvGrpSpPr/>
+        <p:nvPr/>
+      </p:nvGrpSpPr>
+      <p:grpSpPr>
+        <a:xfrm>
+          <a:off x="0" y="0"/>
+          <a:ext cx="0" cy="0"/>
+          <a:chOff x="0" y="0"/>
+          <a:chExt cx="0" cy="0"/>
+        </a:xfrm>
+      </p:grpSpPr>
+      <p:sp>
+        <p:nvSpPr>
+          <p:cNvPr id="2" name="Rectangle 1"/>
+          <p:cNvSpPr/>
+          <p:nvPr/>
+        </p:nvSpPr>
+        <p:spPr>
+          <a:xfrm>
+            <a:off x="1979712" y="188640"/>
+            <a:ext cx="6696744" cy="492443"/>
+          </a:xfrm>
+          <a:prstGeom prst="rect">
+            <a:avLst/>
+          </a:prstGeom>
+        </p:spPr>
+        <p:txBody>
+          <a:bodyPr wrap="square">
+            <a:spAutoFit/>
+          </a:bodyPr>
+          <a:lstStyle/>
+          <a:p>
+            <a:pPr algn="ctr"/>
+            <a:r>
+              <a:rPr lang="pl-PL" sz="2600" dirty="0">
+                <a:solidFill>
+                  <a:schemeClr val="bg1"/>
+                </a:solidFill>
+                <a:latin typeface="Verdana" panose="020B0604030504040204" pitchFamily="34" charset="0"/>
+                <a:ea typeface="Verdana" panose="020B0604030504040204" pitchFamily="34" charset="0"/>
+                <a:cs typeface="Verdana" panose="020B0604030504040204" pitchFamily="34" charset="0"/>
+              </a:rPr>
+              <a:t>Java</a:t>
+            </a:r>
+          </a:p>
+        </p:txBody>
+      </p:sp>
+      <p:sp>
+        <p:nvSpPr>
+          <p:cNvPr id="6" name="Prostokąt 5">
+            <a:extLst>
+              <a:ext uri="{FF2B5EF4-FFF2-40B4-BE49-F238E27FC236}">
+                <a16:creationId xmlns:a16="http://schemas.microsoft.com/office/drawing/2014/main" id="{CA41B780-B57E-411C-AAD5-3D3D6912F664}"/>
+              </a:ext>
+            </a:extLst>
+          </p:cNvPr>
+          <p:cNvSpPr/>
+          <p:nvPr/>
+        </p:nvSpPr>
+        <p:spPr>
+          <a:xfrm>
+            <a:off x="0" y="836712"/>
+            <a:ext cx="9144000" cy="6021288"/>
+          </a:xfrm>
+          <a:prstGeom prst="rect">
+            <a:avLst/>
+          </a:prstGeom>
+          <a:solidFill>
+            <a:schemeClr val="tx1">
+              <a:lumMod val="75000"/>
+              <a:lumOff val="25000"/>
+            </a:schemeClr>
+          </a:solidFill>
+        </p:spPr>
+        <p:style>
+          <a:lnRef idx="1">
+            <a:schemeClr val="accent1"/>
+          </a:lnRef>
+          <a:fillRef idx="3">
+            <a:schemeClr val="accent1"/>
+          </a:fillRef>
+          <a:effectRef idx="2">
+            <a:schemeClr val="accent1"/>
+          </a:effectRef>
+          <a:fontRef idx="minor">
+            <a:schemeClr val="lt1"/>
+          </a:fontRef>
+        </p:style>
+        <p:txBody>
+          <a:bodyPr rtlCol="0" anchor="ctr"/>
+          <a:lstStyle/>
+          <a:p>
+            <a:pPr algn="ctr"/>
+            <a:endParaRPr lang="pl-PL"/>
+          </a:p>
+        </p:txBody>
+      </p:sp>
+      <p:sp>
+        <p:nvSpPr>
+          <p:cNvPr id="7" name="TextBox 1">
+            <a:extLst>
+              <a:ext uri="{FF2B5EF4-FFF2-40B4-BE49-F238E27FC236}">
+                <a16:creationId xmlns:a16="http://schemas.microsoft.com/office/drawing/2014/main" id="{4F847D94-AACF-4C4F-B7B3-12C06B88138B}"/>
+              </a:ext>
+            </a:extLst>
+          </p:cNvPr>
+          <p:cNvSpPr txBox="1"/>
+          <p:nvPr/>
+        </p:nvSpPr>
+        <p:spPr>
+          <a:xfrm>
+            <a:off x="539552" y="1052736"/>
+            <a:ext cx="8172400" cy="5262979"/>
+          </a:xfrm>
+          <a:prstGeom prst="rect">
+            <a:avLst/>
+          </a:prstGeom>
+          <a:noFill/>
+        </p:spPr>
+        <p:txBody>
+          <a:bodyPr wrap="square" rtlCol="0">
+            <a:spAutoFit/>
+          </a:bodyPr>
+          <a:lstStyle/>
+          <a:p>
+            <a:pPr marL="342900" indent="-342900">
+              <a:buFont typeface="Arial" panose="020B0604020202020204" pitchFamily="34" charset="0"/>
+              <a:buChar char="•"/>
+            </a:pPr>
+            <a:r>
+              <a:rPr lang="pl-PL" sz="2400" dirty="0">
+                <a:solidFill>
+                  <a:schemeClr val="bg1"/>
+                </a:solidFill>
+              </a:rPr>
+              <a:t>Niektóre podobieństwa do C/C++</a:t>
+            </a:r>
+          </a:p>
+          <a:p>
+            <a:pPr marL="800100" lvl="1" indent="-342900">
+              <a:buFont typeface="Arial" panose="020B0604020202020204" pitchFamily="34" charset="0"/>
+              <a:buChar char="•"/>
+            </a:pPr>
+            <a:r>
+              <a:rPr lang="pl-PL" sz="2400" dirty="0">
+                <a:solidFill>
+                  <a:schemeClr val="bg1"/>
+                </a:solidFill>
+              </a:rPr>
+              <a:t>Styl pisania komentarzy</a:t>
+            </a:r>
+          </a:p>
+          <a:p>
+            <a:pPr marL="800100" lvl="1" indent="-342900">
+              <a:buFont typeface="Arial" panose="020B0604020202020204" pitchFamily="34" charset="0"/>
+              <a:buChar char="•"/>
+            </a:pPr>
+            <a:r>
+              <a:rPr lang="pl-PL" sz="2400" dirty="0">
+                <a:solidFill>
+                  <a:schemeClr val="bg1"/>
+                </a:solidFill>
+              </a:rPr>
+              <a:t>Wiele słów kluczowych jest identycznych</a:t>
+            </a:r>
+          </a:p>
+          <a:p>
+            <a:pPr marL="800100" lvl="1" indent="-342900">
+              <a:buFont typeface="Arial" panose="020B0604020202020204" pitchFamily="34" charset="0"/>
+              <a:buChar char="•"/>
+            </a:pPr>
+            <a:r>
+              <a:rPr lang="pl-PL" sz="2400" dirty="0">
+                <a:solidFill>
+                  <a:schemeClr val="bg1"/>
+                </a:solidFill>
+              </a:rPr>
+              <a:t>Typy danych</a:t>
+            </a:r>
+          </a:p>
+          <a:p>
+            <a:pPr marL="800100" lvl="1" indent="-342900">
+              <a:buFont typeface="Arial" panose="020B0604020202020204" pitchFamily="34" charset="0"/>
+              <a:buChar char="•"/>
+            </a:pPr>
+            <a:r>
+              <a:rPr lang="pl-PL" sz="2400" dirty="0">
+                <a:solidFill>
+                  <a:schemeClr val="bg1"/>
+                </a:solidFill>
+              </a:rPr>
+              <a:t>Niemal identyczna struktura kodu</a:t>
+            </a:r>
+          </a:p>
+          <a:p>
+            <a:pPr marL="342900" indent="-342900">
+              <a:buFont typeface="Arial" panose="020B0604020202020204" pitchFamily="34" charset="0"/>
+              <a:buChar char="•"/>
+            </a:pPr>
+            <a:r>
+              <a:rPr lang="pl-PL" sz="2400" dirty="0">
+                <a:solidFill>
+                  <a:schemeClr val="bg1"/>
+                </a:solidFill>
+              </a:rPr>
+              <a:t>Niektóre różnice</a:t>
+            </a:r>
+          </a:p>
+          <a:p>
+            <a:pPr marL="800100" lvl="1" indent="-342900">
+              <a:buFont typeface="Arial" panose="020B0604020202020204" pitchFamily="34" charset="0"/>
+              <a:buChar char="•"/>
+            </a:pPr>
+            <a:r>
+              <a:rPr lang="pl-PL" sz="2400" dirty="0">
+                <a:solidFill>
+                  <a:schemeClr val="bg1"/>
+                </a:solidFill>
+              </a:rPr>
+              <a:t>Java wprowadza wiele słów kluczowych nieznanych z C/C++</a:t>
+            </a:r>
+          </a:p>
+          <a:p>
+            <a:pPr marL="800100" lvl="1" indent="-342900">
+              <a:buFont typeface="Arial" panose="020B0604020202020204" pitchFamily="34" charset="0"/>
+              <a:buChar char="•"/>
+            </a:pPr>
+            <a:r>
+              <a:rPr lang="pl-PL" sz="2400" dirty="0">
+                <a:solidFill>
+                  <a:schemeClr val="bg1"/>
+                </a:solidFill>
+              </a:rPr>
+              <a:t>Występują operatory nieznane w C/C++</a:t>
+            </a:r>
+          </a:p>
+          <a:p>
+            <a:pPr marL="800100" lvl="1" indent="-342900">
+              <a:buFont typeface="Arial" panose="020B0604020202020204" pitchFamily="34" charset="0"/>
+              <a:buChar char="•"/>
+            </a:pPr>
+            <a:r>
+              <a:rPr lang="pl-PL" sz="2400" dirty="0">
+                <a:solidFill>
+                  <a:schemeClr val="bg1"/>
+                </a:solidFill>
+              </a:rPr>
+              <a:t>Nie występuje przeciążanie operatorów</a:t>
+            </a:r>
+          </a:p>
+          <a:p>
+            <a:pPr marL="800100" lvl="1" indent="-342900">
+              <a:buFont typeface="Arial" panose="020B0604020202020204" pitchFamily="34" charset="0"/>
+              <a:buChar char="•"/>
+            </a:pPr>
+            <a:r>
+              <a:rPr lang="pl-PL" sz="2400" dirty="0">
+                <a:solidFill>
+                  <a:schemeClr val="bg1"/>
+                </a:solidFill>
+              </a:rPr>
+              <a:t>Brak niektórych cech języka np. wskaźniki</a:t>
+            </a:r>
+          </a:p>
+          <a:p>
+            <a:pPr marL="800100" lvl="1" indent="-342900">
+              <a:buFont typeface="Arial" panose="020B0604020202020204" pitchFamily="34" charset="0"/>
+              <a:buChar char="•"/>
+            </a:pPr>
+            <a:r>
+              <a:rPr lang="pl-PL" sz="2400" dirty="0">
+                <a:solidFill>
+                  <a:schemeClr val="bg1"/>
+                </a:solidFill>
+              </a:rPr>
+              <a:t>Niektóre cechy języka są zmodyfikowane w porównaniu do C/C++ - pętle musza być kontrolowane przez wyrażenia logiczne</a:t>
+            </a:r>
+          </a:p>
+        </p:txBody>
+      </p:sp>
+    </p:spTree>
+    <p:extLst>
+      <p:ext uri="{BB962C8B-B14F-4D97-AF65-F5344CB8AC3E}">
+        <p14:creationId xmlns:p14="http://schemas.microsoft.com/office/powerpoint/2010/main" val="851261723"/>
+      </p:ext>
+    </p:extLst>
+  </p:cSld>
+  <p:clrMapOvr>
+    <a:masterClrMapping/>
+  </p:clrMapOvr>
+</p:sld>
+</file>
+
+<file path=ppt/slides/slide14.xml><?xml version="1.0" encoding="utf-8"?>
+<p:sld xmlns:a="http://schemas.openxmlformats.org/drawingml/2006/main" xmlns:r="http://schemas.openxmlformats.org/officeDocument/2006/relationships" xmlns:p="http://schemas.openxmlformats.org/presentationml/2006/main">
+  <p:cSld>
+    <p:bg>
+      <p:bgPr>
+        <a:blipFill dpi="0" rotWithShape="0">
+          <a:blip r:embed="rId3" cstate="print"/>
+          <a:srcRect/>
+          <a:stretch>
+            <a:fillRect/>
+          </a:stretch>
+        </a:blipFill>
+        <a:effectLst/>
+      </p:bgPr>
+    </p:bg>
+    <p:spTree>
+      <p:nvGrpSpPr>
+        <p:cNvPr id="1" name=""/>
+        <p:cNvGrpSpPr/>
+        <p:nvPr/>
+      </p:nvGrpSpPr>
+      <p:grpSpPr>
+        <a:xfrm>
+          <a:off x="0" y="0"/>
+          <a:ext cx="0" cy="0"/>
+          <a:chOff x="0" y="0"/>
+          <a:chExt cx="0" cy="0"/>
+        </a:xfrm>
+      </p:grpSpPr>
+      <p:sp>
+        <p:nvSpPr>
+          <p:cNvPr id="2" name="Rectangle 1"/>
+          <p:cNvSpPr/>
+          <p:nvPr/>
+        </p:nvSpPr>
+        <p:spPr>
+          <a:xfrm>
+            <a:off x="1979712" y="188640"/>
+            <a:ext cx="6696744" cy="492443"/>
+          </a:xfrm>
+          <a:prstGeom prst="rect">
+            <a:avLst/>
+          </a:prstGeom>
+        </p:spPr>
+        <p:txBody>
+          <a:bodyPr wrap="square">
+            <a:spAutoFit/>
+          </a:bodyPr>
+          <a:lstStyle/>
+          <a:p>
+            <a:pPr algn="ctr"/>
+            <a:r>
+              <a:rPr lang="pl-PL" sz="2600" dirty="0">
+                <a:solidFill>
+                  <a:schemeClr val="bg1"/>
+                </a:solidFill>
+                <a:latin typeface="Verdana" panose="020B0604030504040204" pitchFamily="34" charset="0"/>
+                <a:ea typeface="Verdana" panose="020B0604030504040204" pitchFamily="34" charset="0"/>
+                <a:cs typeface="Verdana" panose="020B0604030504040204" pitchFamily="34" charset="0"/>
+              </a:rPr>
+              <a:t>Kotlin</a:t>
+            </a:r>
+          </a:p>
+        </p:txBody>
+      </p:sp>
+      <p:sp>
+        <p:nvSpPr>
+          <p:cNvPr id="6" name="Prostokąt 5">
+            <a:extLst>
+              <a:ext uri="{FF2B5EF4-FFF2-40B4-BE49-F238E27FC236}">
+                <a16:creationId xmlns:a16="http://schemas.microsoft.com/office/drawing/2014/main" id="{CA41B780-B57E-411C-AAD5-3D3D6912F664}"/>
+              </a:ext>
+            </a:extLst>
+          </p:cNvPr>
+          <p:cNvSpPr/>
+          <p:nvPr/>
+        </p:nvSpPr>
+        <p:spPr>
+          <a:xfrm>
+            <a:off x="0" y="836712"/>
+            <a:ext cx="9144000" cy="6021288"/>
+          </a:xfrm>
+          <a:prstGeom prst="rect">
+            <a:avLst/>
+          </a:prstGeom>
+          <a:solidFill>
+            <a:schemeClr val="tx1">
+              <a:lumMod val="75000"/>
+              <a:lumOff val="25000"/>
+            </a:schemeClr>
+          </a:solidFill>
+        </p:spPr>
+        <p:style>
+          <a:lnRef idx="1">
+            <a:schemeClr val="accent1"/>
+          </a:lnRef>
+          <a:fillRef idx="3">
+            <a:schemeClr val="accent1"/>
+          </a:fillRef>
+          <a:effectRef idx="2">
+            <a:schemeClr val="accent1"/>
+          </a:effectRef>
+          <a:fontRef idx="minor">
+            <a:schemeClr val="lt1"/>
+          </a:fontRef>
+        </p:style>
+        <p:txBody>
+          <a:bodyPr rtlCol="0" anchor="ctr"/>
+          <a:lstStyle/>
+          <a:p>
+            <a:pPr algn="ctr"/>
+            <a:endParaRPr lang="pl-PL"/>
+          </a:p>
+        </p:txBody>
+      </p:sp>
+      <p:sp>
+        <p:nvSpPr>
+          <p:cNvPr id="8" name="TextBox 1">
+            <a:extLst>
+              <a:ext uri="{FF2B5EF4-FFF2-40B4-BE49-F238E27FC236}">
+                <a16:creationId xmlns:a16="http://schemas.microsoft.com/office/drawing/2014/main" id="{1AB35A18-EB6A-49A9-A227-52DE8F1EF9EC}"/>
+              </a:ext>
+            </a:extLst>
+          </p:cNvPr>
+          <p:cNvSpPr txBox="1"/>
+          <p:nvPr/>
+        </p:nvSpPr>
+        <p:spPr>
+          <a:xfrm>
+            <a:off x="251520" y="1412776"/>
+            <a:ext cx="8172400" cy="4154984"/>
+          </a:xfrm>
+          <a:prstGeom prst="rect">
+            <a:avLst/>
+          </a:prstGeom>
+          <a:noFill/>
+        </p:spPr>
+        <p:txBody>
+          <a:bodyPr wrap="square" rtlCol="0">
+            <a:spAutoFit/>
+          </a:bodyPr>
+          <a:lstStyle/>
+          <a:p>
+            <a:pPr marL="342900" indent="-342900">
+              <a:buFont typeface="Arial" panose="020B0604020202020204" pitchFamily="34" charset="0"/>
+              <a:buChar char="•"/>
+            </a:pPr>
+            <a:r>
+              <a:rPr lang="pl-PL" sz="2400" dirty="0">
+                <a:solidFill>
+                  <a:schemeClr val="bg1"/>
+                </a:solidFill>
+              </a:rPr>
+              <a:t>Cechy języka</a:t>
+            </a:r>
+          </a:p>
+          <a:p>
+            <a:pPr marL="800100" lvl="1" indent="-342900">
+              <a:buFont typeface="Arial" panose="020B0604020202020204" pitchFamily="34" charset="0"/>
+              <a:buChar char="•"/>
+            </a:pPr>
+            <a:r>
+              <a:rPr lang="pl-PL" sz="2400" dirty="0">
+                <a:solidFill>
+                  <a:schemeClr val="bg1"/>
+                </a:solidFill>
+              </a:rPr>
+              <a:t>Statyczne typowanie danych – na etapie kompilacji typy wyrażeń są znane a kompilator sprawdza czy istnieją pola i metody w obiektach do których odwołujemy się w kodzie</a:t>
+            </a:r>
+          </a:p>
+          <a:p>
+            <a:pPr marL="800100" lvl="1" indent="-342900">
+              <a:buFont typeface="Arial" panose="020B0604020202020204" pitchFamily="34" charset="0"/>
+              <a:buChar char="•"/>
+            </a:pPr>
+            <a:r>
+              <a:rPr lang="pl-PL" sz="2400" dirty="0">
+                <a:solidFill>
+                  <a:schemeClr val="bg1"/>
+                </a:solidFill>
+              </a:rPr>
+              <a:t>Domniemanie typów – typ danych jest określany przez kompilator na podstawie kontekstu</a:t>
+            </a:r>
+          </a:p>
+          <a:p>
+            <a:pPr marL="800100" lvl="1" indent="-342900">
+              <a:buFont typeface="Arial" panose="020B0604020202020204" pitchFamily="34" charset="0"/>
+              <a:buChar char="•"/>
+            </a:pPr>
+            <a:r>
+              <a:rPr lang="pl-PL" sz="2400" dirty="0">
+                <a:solidFill>
+                  <a:schemeClr val="bg1"/>
+                </a:solidFill>
+              </a:rPr>
+              <a:t>Typy </a:t>
+            </a:r>
+            <a:r>
+              <a:rPr lang="pl-PL" sz="2400" dirty="0" err="1">
+                <a:solidFill>
+                  <a:schemeClr val="bg1"/>
+                </a:solidFill>
+              </a:rPr>
+              <a:t>zerowalne</a:t>
+            </a:r>
+            <a:endParaRPr lang="pl-PL" sz="2400" dirty="0">
+              <a:solidFill>
+                <a:schemeClr val="bg1"/>
+              </a:solidFill>
+            </a:endParaRPr>
+          </a:p>
+          <a:p>
+            <a:pPr marL="800100" lvl="1" indent="-342900">
+              <a:buFont typeface="Arial" panose="020B0604020202020204" pitchFamily="34" charset="0"/>
+              <a:buChar char="•"/>
+            </a:pPr>
+            <a:r>
+              <a:rPr lang="pl-PL" sz="2400" dirty="0">
+                <a:solidFill>
+                  <a:schemeClr val="bg1"/>
+                </a:solidFill>
+              </a:rPr>
+              <a:t>Typy funkcyjne</a:t>
+            </a:r>
+          </a:p>
+          <a:p>
+            <a:pPr marL="800100" lvl="1" indent="-342900">
+              <a:buFont typeface="Arial" panose="020B0604020202020204" pitchFamily="34" charset="0"/>
+              <a:buChar char="•"/>
+            </a:pPr>
+            <a:r>
+              <a:rPr lang="pl-PL" sz="2400" dirty="0">
+                <a:solidFill>
+                  <a:schemeClr val="bg1"/>
+                </a:solidFill>
+              </a:rPr>
+              <a:t>Klasy danych</a:t>
+            </a:r>
+          </a:p>
+          <a:p>
+            <a:pPr marL="800100" lvl="1" indent="-342900">
+              <a:buFont typeface="Arial" panose="020B0604020202020204" pitchFamily="34" charset="0"/>
+              <a:buChar char="•"/>
+            </a:pPr>
+            <a:r>
+              <a:rPr lang="pl-PL" sz="2400" dirty="0">
+                <a:solidFill>
+                  <a:schemeClr val="bg1"/>
+                </a:solidFill>
+              </a:rPr>
+              <a:t>Można łączyć programowanie obiektowe i funkcyjne</a:t>
+            </a:r>
+          </a:p>
+        </p:txBody>
+      </p:sp>
+    </p:spTree>
+    <p:extLst>
+      <p:ext uri="{BB962C8B-B14F-4D97-AF65-F5344CB8AC3E}">
+        <p14:creationId xmlns:p14="http://schemas.microsoft.com/office/powerpoint/2010/main" val="1085902210"/>
+      </p:ext>
+    </p:extLst>
+  </p:cSld>
+  <p:clrMapOvr>
+    <a:masterClrMapping/>
+  </p:clrMapOvr>
+</p:sld>
+</file>
+
+<file path=ppt/slides/slide15.xml><?xml version="1.0" encoding="utf-8"?>
+<p:sld xmlns:a="http://schemas.openxmlformats.org/drawingml/2006/main" xmlns:r="http://schemas.openxmlformats.org/officeDocument/2006/relationships" xmlns:p="http://schemas.openxmlformats.org/presentationml/2006/main">
+  <p:cSld>
+    <p:bg>
+      <p:bgPr>
+        <a:blipFill dpi="0" rotWithShape="0">
+          <a:blip r:embed="rId3" cstate="print"/>
+          <a:srcRect/>
+          <a:stretch>
+            <a:fillRect/>
+          </a:stretch>
+        </a:blipFill>
+        <a:effectLst/>
+      </p:bgPr>
+    </p:bg>
+    <p:spTree>
+      <p:nvGrpSpPr>
+        <p:cNvPr id="1" name=""/>
+        <p:cNvGrpSpPr/>
+        <p:nvPr/>
+      </p:nvGrpSpPr>
+      <p:grpSpPr>
+        <a:xfrm>
+          <a:off x="0" y="0"/>
+          <a:ext cx="0" cy="0"/>
+          <a:chOff x="0" y="0"/>
+          <a:chExt cx="0" cy="0"/>
+        </a:xfrm>
+      </p:grpSpPr>
+      <p:sp>
+        <p:nvSpPr>
+          <p:cNvPr id="2" name="Rectangle 1"/>
+          <p:cNvSpPr/>
+          <p:nvPr/>
+        </p:nvSpPr>
+        <p:spPr>
+          <a:xfrm>
+            <a:off x="1979712" y="188640"/>
+            <a:ext cx="6696744" cy="492443"/>
+          </a:xfrm>
+          <a:prstGeom prst="rect">
+            <a:avLst/>
+          </a:prstGeom>
+        </p:spPr>
+        <p:txBody>
+          <a:bodyPr wrap="square">
+            <a:spAutoFit/>
+          </a:bodyPr>
+          <a:lstStyle/>
+          <a:p>
+            <a:pPr algn="ctr"/>
+            <a:r>
+              <a:rPr lang="pl-PL" sz="2600" dirty="0">
+                <a:solidFill>
+                  <a:schemeClr val="bg1"/>
+                </a:solidFill>
+                <a:latin typeface="Verdana" panose="020B0604030504040204" pitchFamily="34" charset="0"/>
+                <a:ea typeface="Verdana" panose="020B0604030504040204" pitchFamily="34" charset="0"/>
+                <a:cs typeface="Verdana" panose="020B0604030504040204" pitchFamily="34" charset="0"/>
+              </a:rPr>
+              <a:t>Kotlin</a:t>
+            </a:r>
+          </a:p>
+        </p:txBody>
+      </p:sp>
+      <p:sp>
+        <p:nvSpPr>
+          <p:cNvPr id="6" name="Prostokąt 5">
+            <a:extLst>
+              <a:ext uri="{FF2B5EF4-FFF2-40B4-BE49-F238E27FC236}">
+                <a16:creationId xmlns:a16="http://schemas.microsoft.com/office/drawing/2014/main" id="{CA41B780-B57E-411C-AAD5-3D3D6912F664}"/>
+              </a:ext>
+            </a:extLst>
+          </p:cNvPr>
+          <p:cNvSpPr/>
+          <p:nvPr/>
+        </p:nvSpPr>
+        <p:spPr>
+          <a:xfrm>
+            <a:off x="0" y="836712"/>
+            <a:ext cx="9144000" cy="6021288"/>
+          </a:xfrm>
+          <a:prstGeom prst="rect">
+            <a:avLst/>
+          </a:prstGeom>
+          <a:solidFill>
+            <a:schemeClr val="tx1">
+              <a:lumMod val="75000"/>
+              <a:lumOff val="25000"/>
+            </a:schemeClr>
+          </a:solidFill>
+        </p:spPr>
+        <p:style>
+          <a:lnRef idx="1">
+            <a:schemeClr val="accent1"/>
+          </a:lnRef>
+          <a:fillRef idx="3">
+            <a:schemeClr val="accent1"/>
+          </a:fillRef>
+          <a:effectRef idx="2">
+            <a:schemeClr val="accent1"/>
+          </a:effectRef>
+          <a:fontRef idx="minor">
+            <a:schemeClr val="lt1"/>
+          </a:fontRef>
+        </p:style>
+        <p:txBody>
+          <a:bodyPr rtlCol="0" anchor="ctr"/>
+          <a:lstStyle/>
+          <a:p>
+            <a:pPr algn="ctr"/>
+            <a:endParaRPr lang="pl-PL"/>
+          </a:p>
+        </p:txBody>
+      </p:sp>
+      <p:sp>
+        <p:nvSpPr>
+          <p:cNvPr id="8" name="TextBox 1">
+            <a:extLst>
+              <a:ext uri="{FF2B5EF4-FFF2-40B4-BE49-F238E27FC236}">
+                <a16:creationId xmlns:a16="http://schemas.microsoft.com/office/drawing/2014/main" id="{1AB35A18-EB6A-49A9-A227-52DE8F1EF9EC}"/>
+              </a:ext>
+            </a:extLst>
+          </p:cNvPr>
+          <p:cNvSpPr txBox="1"/>
+          <p:nvPr/>
+        </p:nvSpPr>
+        <p:spPr>
+          <a:xfrm>
+            <a:off x="395536" y="1844824"/>
+            <a:ext cx="8172400" cy="3785652"/>
+          </a:xfrm>
+          <a:prstGeom prst="rect">
+            <a:avLst/>
+          </a:prstGeom>
+          <a:noFill/>
+        </p:spPr>
+        <p:txBody>
+          <a:bodyPr wrap="square" rtlCol="0">
+            <a:spAutoFit/>
+          </a:bodyPr>
+          <a:lstStyle/>
+          <a:p>
+            <a:pPr marL="342900" indent="-342900">
+              <a:buFont typeface="Arial" panose="020B0604020202020204" pitchFamily="34" charset="0"/>
+              <a:buChar char="•"/>
+            </a:pPr>
+            <a:r>
+              <a:rPr lang="pl-PL" sz="2400" dirty="0">
+                <a:solidFill>
+                  <a:schemeClr val="bg1"/>
+                </a:solidFill>
+              </a:rPr>
+              <a:t>Właściwości języka</a:t>
+            </a:r>
+          </a:p>
+          <a:p>
+            <a:pPr marL="800100" lvl="1" indent="-342900">
+              <a:buFont typeface="Arial" panose="020B0604020202020204" pitchFamily="34" charset="0"/>
+              <a:buChar char="•"/>
+            </a:pPr>
+            <a:r>
+              <a:rPr lang="pl-PL" sz="2400" dirty="0">
+                <a:solidFill>
+                  <a:schemeClr val="bg1"/>
+                </a:solidFill>
+              </a:rPr>
+              <a:t>Pragmatyzm – język jest przeznaczony do rozwiązywania praktycznych problemów</a:t>
+            </a:r>
+          </a:p>
+          <a:p>
+            <a:pPr marL="800100" lvl="1" indent="-342900">
+              <a:buFont typeface="Arial" panose="020B0604020202020204" pitchFamily="34" charset="0"/>
+              <a:buChar char="•"/>
+            </a:pPr>
+            <a:r>
+              <a:rPr lang="pl-PL" sz="2400" dirty="0">
+                <a:solidFill>
+                  <a:schemeClr val="bg1"/>
+                </a:solidFill>
+              </a:rPr>
+              <a:t>Jest językiem przemysłowym – nie wprowadza nowych rozwiązań do programowania – wykorzystuje rozwiązania znane z innych języków</a:t>
+            </a:r>
+          </a:p>
+          <a:p>
+            <a:pPr marL="800100" lvl="1" indent="-342900">
+              <a:buFont typeface="Arial" panose="020B0604020202020204" pitchFamily="34" charset="0"/>
+              <a:buChar char="•"/>
+            </a:pPr>
+            <a:r>
+              <a:rPr lang="pl-PL" sz="2400" dirty="0">
+                <a:solidFill>
+                  <a:schemeClr val="bg1"/>
+                </a:solidFill>
+              </a:rPr>
+              <a:t>Nie narzuca stylu/zasad programowania</a:t>
+            </a:r>
+          </a:p>
+          <a:p>
+            <a:pPr marL="800100" lvl="1" indent="-342900">
+              <a:buFont typeface="Arial" panose="020B0604020202020204" pitchFamily="34" charset="0"/>
+              <a:buChar char="•"/>
+            </a:pPr>
+            <a:r>
+              <a:rPr lang="pl-PL" sz="2400" dirty="0">
+                <a:solidFill>
+                  <a:schemeClr val="bg1"/>
+                </a:solidFill>
+              </a:rPr>
+              <a:t>Zwięzłość – im prostszy i krótszy kod tym lepiej</a:t>
+            </a:r>
+          </a:p>
+          <a:p>
+            <a:pPr marL="800100" lvl="1" indent="-342900">
+              <a:buFont typeface="Arial" panose="020B0604020202020204" pitchFamily="34" charset="0"/>
+              <a:buChar char="•"/>
+            </a:pPr>
+            <a:r>
+              <a:rPr lang="pl-PL" sz="2400" dirty="0">
+                <a:solidFill>
+                  <a:schemeClr val="bg1"/>
+                </a:solidFill>
+              </a:rPr>
+              <a:t>Kompatybilność – można wywoływać metody Java</a:t>
+            </a:r>
+          </a:p>
+          <a:p>
+            <a:pPr marL="800100" lvl="1" indent="-342900">
+              <a:buFont typeface="Arial" panose="020B0604020202020204" pitchFamily="34" charset="0"/>
+              <a:buChar char="•"/>
+            </a:pPr>
+            <a:r>
+              <a:rPr lang="pl-PL" sz="2400" dirty="0">
+                <a:solidFill>
+                  <a:schemeClr val="bg1"/>
+                </a:solidFill>
+              </a:rPr>
+              <a:t>Nie posiada własnych bibliotek</a:t>
+            </a:r>
+          </a:p>
+        </p:txBody>
+      </p:sp>
+    </p:spTree>
+    <p:extLst>
+      <p:ext uri="{BB962C8B-B14F-4D97-AF65-F5344CB8AC3E}">
+        <p14:creationId xmlns:p14="http://schemas.microsoft.com/office/powerpoint/2010/main" val="2844344421"/>
+      </p:ext>
+    </p:extLst>
+  </p:cSld>
+  <p:clrMapOvr>
+    <a:masterClrMapping/>
+  </p:clrMapOvr>
+</p:sld>
+</file>
+
+<file path=ppt/slides/slide16.xml><?xml version="1.0" encoding="utf-8"?>
+<p:sld xmlns:a="http://schemas.openxmlformats.org/drawingml/2006/main" xmlns:r="http://schemas.openxmlformats.org/officeDocument/2006/relationships" xmlns:p="http://schemas.openxmlformats.org/presentationml/2006/main">
+  <p:cSld>
+    <p:bg>
+      <p:bgPr>
+        <a:blipFill dpi="0" rotWithShape="0">
+          <a:blip r:embed="rId3" cstate="print"/>
+          <a:srcRect/>
+          <a:stretch>
+            <a:fillRect/>
+          </a:stretch>
+        </a:blipFill>
+        <a:effectLst/>
+      </p:bgPr>
+    </p:bg>
+    <p:spTree>
+      <p:nvGrpSpPr>
+        <p:cNvPr id="1" name=""/>
+        <p:cNvGrpSpPr/>
+        <p:nvPr/>
+      </p:nvGrpSpPr>
+      <p:grpSpPr>
+        <a:xfrm>
+          <a:off x="0" y="0"/>
+          <a:ext cx="0" cy="0"/>
+          <a:chOff x="0" y="0"/>
+          <a:chExt cx="0" cy="0"/>
+        </a:xfrm>
+      </p:grpSpPr>
+      <p:sp>
+        <p:nvSpPr>
+          <p:cNvPr id="2" name="Rectangle 1"/>
+          <p:cNvSpPr/>
+          <p:nvPr/>
+        </p:nvSpPr>
+        <p:spPr>
+          <a:xfrm>
+            <a:off x="1979712" y="188640"/>
+            <a:ext cx="6696744" cy="492443"/>
+          </a:xfrm>
+          <a:prstGeom prst="rect">
+            <a:avLst/>
+          </a:prstGeom>
+        </p:spPr>
+        <p:txBody>
+          <a:bodyPr wrap="square">
+            <a:spAutoFit/>
+          </a:bodyPr>
+          <a:lstStyle/>
+          <a:p>
+            <a:pPr algn="ctr"/>
+            <a:r>
+              <a:rPr lang="pl-PL" sz="2600" dirty="0" err="1">
+                <a:solidFill>
+                  <a:schemeClr val="bg1"/>
+                </a:solidFill>
+                <a:latin typeface="Verdana" panose="020B0604030504040204" pitchFamily="34" charset="0"/>
+                <a:ea typeface="Verdana" panose="020B0604030504040204" pitchFamily="34" charset="0"/>
+                <a:cs typeface="Verdana" panose="020B0604030504040204" pitchFamily="34" charset="0"/>
+              </a:rPr>
+              <a:t>Gradle</a:t>
+            </a:r>
+            <a:endParaRPr lang="pl-PL" sz="2600" dirty="0">
+              <a:solidFill>
+                <a:schemeClr val="bg1"/>
+              </a:solidFill>
+              <a:latin typeface="Verdana" panose="020B0604030504040204" pitchFamily="34" charset="0"/>
+              <a:ea typeface="Verdana" panose="020B0604030504040204" pitchFamily="34" charset="0"/>
+              <a:cs typeface="Verdana" panose="020B0604030504040204" pitchFamily="34" charset="0"/>
+            </a:endParaRPr>
+          </a:p>
+        </p:txBody>
+      </p:sp>
+      <p:sp>
+        <p:nvSpPr>
+          <p:cNvPr id="6" name="Prostokąt 5">
+            <a:extLst>
+              <a:ext uri="{FF2B5EF4-FFF2-40B4-BE49-F238E27FC236}">
+                <a16:creationId xmlns:a16="http://schemas.microsoft.com/office/drawing/2014/main" id="{CA41B780-B57E-411C-AAD5-3D3D6912F664}"/>
+              </a:ext>
+            </a:extLst>
+          </p:cNvPr>
+          <p:cNvSpPr/>
+          <p:nvPr/>
+        </p:nvSpPr>
+        <p:spPr>
+          <a:xfrm>
+            <a:off x="0" y="836712"/>
+            <a:ext cx="9144000" cy="6021288"/>
+          </a:xfrm>
+          <a:prstGeom prst="rect">
+            <a:avLst/>
+          </a:prstGeom>
+          <a:solidFill>
+            <a:schemeClr val="tx1">
+              <a:lumMod val="75000"/>
+              <a:lumOff val="25000"/>
+            </a:schemeClr>
+          </a:solidFill>
+        </p:spPr>
+        <p:style>
+          <a:lnRef idx="1">
+            <a:schemeClr val="accent1"/>
+          </a:lnRef>
+          <a:fillRef idx="3">
+            <a:schemeClr val="accent1"/>
+          </a:fillRef>
+          <a:effectRef idx="2">
+            <a:schemeClr val="accent1"/>
+          </a:effectRef>
+          <a:fontRef idx="minor">
+            <a:schemeClr val="lt1"/>
+          </a:fontRef>
+        </p:style>
+        <p:txBody>
+          <a:bodyPr rtlCol="0" anchor="ctr"/>
+          <a:lstStyle/>
+          <a:p>
+            <a:pPr algn="ctr"/>
+            <a:endParaRPr lang="pl-PL"/>
+          </a:p>
+        </p:txBody>
+      </p:sp>
+      <p:pic>
+        <p:nvPicPr>
+          <p:cNvPr id="4" name="Obraz 3">
+            <a:extLst>
+              <a:ext uri="{FF2B5EF4-FFF2-40B4-BE49-F238E27FC236}">
+                <a16:creationId xmlns:a16="http://schemas.microsoft.com/office/drawing/2014/main" id="{9589D940-933A-48EA-92F6-DCE1268DFAFC}"/>
+              </a:ext>
+            </a:extLst>
+          </p:cNvPr>
+          <p:cNvPicPr>
+            <a:picLocks noChangeAspect="1"/>
+          </p:cNvPicPr>
+          <p:nvPr/>
+        </p:nvPicPr>
+        <p:blipFill>
+          <a:blip r:embed="rId4"/>
+          <a:stretch>
+            <a:fillRect/>
+          </a:stretch>
+        </p:blipFill>
+        <p:spPr>
+          <a:xfrm>
+            <a:off x="633809" y="988925"/>
+            <a:ext cx="3305175" cy="3162300"/>
+          </a:xfrm>
+          <a:prstGeom prst="rect">
+            <a:avLst/>
+          </a:prstGeom>
+        </p:spPr>
+      </p:pic>
+      <p:pic>
+        <p:nvPicPr>
+          <p:cNvPr id="7" name="Obraz 6">
+            <a:extLst>
+              <a:ext uri="{FF2B5EF4-FFF2-40B4-BE49-F238E27FC236}">
+                <a16:creationId xmlns:a16="http://schemas.microsoft.com/office/drawing/2014/main" id="{A6D62299-9BA9-42AD-A73F-E008532E61F9}"/>
+              </a:ext>
+            </a:extLst>
+          </p:cNvPr>
+          <p:cNvPicPr>
+            <a:picLocks noChangeAspect="1"/>
+          </p:cNvPicPr>
+          <p:nvPr/>
+        </p:nvPicPr>
+        <p:blipFill>
+          <a:blip r:embed="rId5"/>
+          <a:stretch>
+            <a:fillRect/>
+          </a:stretch>
+        </p:blipFill>
+        <p:spPr>
+          <a:xfrm>
+            <a:off x="642937" y="4151225"/>
+            <a:ext cx="7858125" cy="2343150"/>
+          </a:xfrm>
+          <a:prstGeom prst="rect">
+            <a:avLst/>
+          </a:prstGeom>
+        </p:spPr>
+      </p:pic>
+      <p:pic>
+        <p:nvPicPr>
+          <p:cNvPr id="10" name="Obraz 9">
+            <a:extLst>
+              <a:ext uri="{FF2B5EF4-FFF2-40B4-BE49-F238E27FC236}">
+                <a16:creationId xmlns:a16="http://schemas.microsoft.com/office/drawing/2014/main" id="{3906AA3D-39A6-4BD9-8AD0-892A36A8B858}"/>
+              </a:ext>
+            </a:extLst>
+          </p:cNvPr>
+          <p:cNvPicPr>
+            <a:picLocks noChangeAspect="1"/>
+          </p:cNvPicPr>
+          <p:nvPr/>
+        </p:nvPicPr>
+        <p:blipFill>
+          <a:blip r:embed="rId6"/>
+          <a:stretch>
+            <a:fillRect/>
+          </a:stretch>
+        </p:blipFill>
+        <p:spPr>
+          <a:xfrm>
+            <a:off x="-20528" y="786259"/>
+            <a:ext cx="9254761" cy="6122193"/>
+          </a:xfrm>
+          <a:prstGeom prst="rect">
+            <a:avLst/>
+          </a:prstGeom>
+        </p:spPr>
+      </p:pic>
+    </p:spTree>
+    <p:extLst>
+      <p:ext uri="{BB962C8B-B14F-4D97-AF65-F5344CB8AC3E}">
+        <p14:creationId xmlns:p14="http://schemas.microsoft.com/office/powerpoint/2010/main" val="955526435"/>
+      </p:ext>
+    </p:extLst>
+  </p:cSld>
+  <p:clrMapOvr>
+    <a:masterClrMapping/>
+  </p:clrMapOvr>
+</p:sld>
+</file>
+
+<file path=ppt/slides/slide17.xml><?xml version="1.0" encoding="utf-8"?>
+<p:sld xmlns:a="http://schemas.openxmlformats.org/drawingml/2006/main" xmlns:r="http://schemas.openxmlformats.org/officeDocument/2006/relationships" xmlns:p="http://schemas.openxmlformats.org/presentationml/2006/main">
+  <p:cSld>
+    <p:bg>
+      <p:bgPr>
+        <a:blipFill dpi="0" rotWithShape="0">
+          <a:blip r:embed="rId3" cstate="print"/>
+          <a:srcRect/>
+          <a:stretch>
+            <a:fillRect/>
+          </a:stretch>
+        </a:blipFill>
+        <a:effectLst/>
+      </p:bgPr>
+    </p:bg>
+    <p:spTree>
+      <p:nvGrpSpPr>
+        <p:cNvPr id="1" name=""/>
+        <p:cNvGrpSpPr/>
+        <p:nvPr/>
+      </p:nvGrpSpPr>
+      <p:grpSpPr>
+        <a:xfrm>
+          <a:off x="0" y="0"/>
+          <a:ext cx="0" cy="0"/>
+          <a:chOff x="0" y="0"/>
+          <a:chExt cx="0" cy="0"/>
+        </a:xfrm>
+      </p:grpSpPr>
+      <p:sp>
+        <p:nvSpPr>
+          <p:cNvPr id="2" name="Rectangle 1"/>
+          <p:cNvSpPr/>
+          <p:nvPr/>
+        </p:nvSpPr>
+        <p:spPr>
+          <a:xfrm>
+            <a:off x="1979712" y="188640"/>
+            <a:ext cx="6696744" cy="492443"/>
+          </a:xfrm>
+          <a:prstGeom prst="rect">
+            <a:avLst/>
+          </a:prstGeom>
+        </p:spPr>
+        <p:txBody>
+          <a:bodyPr wrap="square">
+            <a:spAutoFit/>
+          </a:bodyPr>
+          <a:lstStyle/>
+          <a:p>
+            <a:pPr algn="ctr"/>
+            <a:r>
+              <a:rPr lang="pl-PL" sz="2600" dirty="0" err="1">
+                <a:solidFill>
+                  <a:schemeClr val="bg1"/>
+                </a:solidFill>
+                <a:latin typeface="Verdana" panose="020B0604030504040204" pitchFamily="34" charset="0"/>
+                <a:ea typeface="Verdana" panose="020B0604030504040204" pitchFamily="34" charset="0"/>
+                <a:cs typeface="Verdana" panose="020B0604030504040204" pitchFamily="34" charset="0"/>
+              </a:rPr>
+              <a:t>Maven</a:t>
+            </a:r>
+            <a:endParaRPr lang="pl-PL" sz="2600" dirty="0">
+              <a:solidFill>
+                <a:schemeClr val="bg1"/>
+              </a:solidFill>
+              <a:latin typeface="Verdana" panose="020B0604030504040204" pitchFamily="34" charset="0"/>
+              <a:ea typeface="Verdana" panose="020B0604030504040204" pitchFamily="34" charset="0"/>
+              <a:cs typeface="Verdana" panose="020B0604030504040204" pitchFamily="34" charset="0"/>
+            </a:endParaRPr>
+          </a:p>
+        </p:txBody>
+      </p:sp>
+      <p:sp>
+        <p:nvSpPr>
+          <p:cNvPr id="6" name="Prostokąt 5">
+            <a:extLst>
+              <a:ext uri="{FF2B5EF4-FFF2-40B4-BE49-F238E27FC236}">
+                <a16:creationId xmlns:a16="http://schemas.microsoft.com/office/drawing/2014/main" id="{CA41B780-B57E-411C-AAD5-3D3D6912F664}"/>
+              </a:ext>
+            </a:extLst>
+          </p:cNvPr>
+          <p:cNvSpPr/>
+          <p:nvPr/>
+        </p:nvSpPr>
+        <p:spPr>
+          <a:xfrm>
+            <a:off x="0" y="836712"/>
+            <a:ext cx="9144000" cy="6021288"/>
+          </a:xfrm>
+          <a:prstGeom prst="rect">
+            <a:avLst/>
+          </a:prstGeom>
+          <a:solidFill>
+            <a:schemeClr val="tx1">
+              <a:lumMod val="75000"/>
+              <a:lumOff val="25000"/>
+            </a:schemeClr>
+          </a:solidFill>
+        </p:spPr>
+        <p:style>
+          <a:lnRef idx="1">
+            <a:schemeClr val="accent1"/>
+          </a:lnRef>
+          <a:fillRef idx="3">
+            <a:schemeClr val="accent1"/>
+          </a:fillRef>
+          <a:effectRef idx="2">
+            <a:schemeClr val="accent1"/>
+          </a:effectRef>
+          <a:fontRef idx="minor">
+            <a:schemeClr val="lt1"/>
+          </a:fontRef>
+        </p:style>
+        <p:txBody>
+          <a:bodyPr rtlCol="0" anchor="ctr"/>
+          <a:lstStyle/>
+          <a:p>
+            <a:pPr algn="ctr"/>
+            <a:endParaRPr lang="pl-PL"/>
+          </a:p>
+        </p:txBody>
+      </p:sp>
+      <p:pic>
+        <p:nvPicPr>
+          <p:cNvPr id="9" name="Obraz 8">
+            <a:extLst>
+              <a:ext uri="{FF2B5EF4-FFF2-40B4-BE49-F238E27FC236}">
+                <a16:creationId xmlns:a16="http://schemas.microsoft.com/office/drawing/2014/main" id="{0E10003A-3EA4-4DDD-A0C8-FB59800ED201}"/>
+              </a:ext>
+            </a:extLst>
+          </p:cNvPr>
+          <p:cNvPicPr>
+            <a:picLocks noChangeAspect="1"/>
+          </p:cNvPicPr>
+          <p:nvPr/>
+        </p:nvPicPr>
+        <p:blipFill>
+          <a:blip r:embed="rId4"/>
+          <a:stretch>
+            <a:fillRect/>
+          </a:stretch>
+        </p:blipFill>
+        <p:spPr>
+          <a:xfrm>
+            <a:off x="-13697" y="1333500"/>
+            <a:ext cx="9247727" cy="4687788"/>
+          </a:xfrm>
+          <a:prstGeom prst="rect">
+            <a:avLst/>
+          </a:prstGeom>
+        </p:spPr>
+      </p:pic>
+    </p:spTree>
+    <p:extLst>
+      <p:ext uri="{BB962C8B-B14F-4D97-AF65-F5344CB8AC3E}">
+        <p14:creationId xmlns:p14="http://schemas.microsoft.com/office/powerpoint/2010/main" val="3245890111"/>
+      </p:ext>
+    </p:extLst>
+  </p:cSld>
+  <p:clrMapOvr>
+    <a:masterClrMapping/>
+  </p:clrMapOvr>
+</p:sld>
+</file>
+
 <file path=ppt/slides/slide2.xml><?xml version="1.0" encoding="utf-8"?>
 <p:sld xmlns:a="http://schemas.openxmlformats.org/drawingml/2006/main" xmlns:r="http://schemas.openxmlformats.org/officeDocument/2006/relationships" xmlns:p="http://schemas.openxmlformats.org/presentationml/2006/main">
   <p:cSld>
@@ -4632,7 +7317,7 @@
         </p:nvSpPr>
         <p:spPr>
           <a:xfrm>
-            <a:off x="1004763" y="2230120"/>
+            <a:off x="1115616" y="2342845"/>
             <a:ext cx="8172401" cy="4524315"/>
           </a:xfrm>
           <a:prstGeom prst="rect">
@@ -4716,7 +7401,7 @@
                   <a:schemeClr val="bg1"/>
                 </a:solidFill>
               </a:rPr>
-              <a:t>•   Kotlin w Akcji. </a:t>
+              <a:t>•   </a:t>
             </a:r>
             <a:r>
               <a:rPr lang="pl-PL" sz="2400" dirty="0" err="1">
@@ -4724,7 +7409,7 @@
                   <a:schemeClr val="bg1"/>
                 </a:solidFill>
               </a:rPr>
-              <a:t>Dmitry</a:t>
+              <a:t>Atomic</a:t>
             </a:r>
             <a:r>
               <a:rPr lang="pl-PL" sz="2400" dirty="0">
@@ -4732,7 +7417,7 @@
                   <a:schemeClr val="bg1"/>
                 </a:solidFill>
               </a:rPr>
-              <a:t> </a:t>
+              <a:t> Kotlin. Bruce </a:t>
             </a:r>
             <a:r>
               <a:rPr lang="pl-PL" sz="2400" dirty="0" err="1">
@@ -4740,39 +7425,7 @@
                   <a:schemeClr val="bg1"/>
                 </a:solidFill>
               </a:rPr>
-              <a:t>Jemerov</a:t>
-            </a:r>
-            <a:r>
-              <a:rPr lang="pl-PL" sz="2400" dirty="0">
-                <a:solidFill>
-                  <a:schemeClr val="bg1"/>
-                </a:solidFill>
-              </a:rPr>
-              <a:t>, </a:t>
-            </a:r>
-            <a:r>
-              <a:rPr lang="pl-PL" sz="2400" dirty="0" err="1">
-                <a:solidFill>
-                  <a:schemeClr val="bg1"/>
-                </a:solidFill>
-              </a:rPr>
-              <a:t>Svetlana</a:t>
-            </a:r>
-            <a:r>
-              <a:rPr lang="pl-PL" sz="2400" dirty="0">
-                <a:solidFill>
-                  <a:schemeClr val="bg1"/>
-                </a:solidFill>
-              </a:rPr>
-              <a:t> </a:t>
-            </a:r>
-            <a:r>
-              <a:rPr lang="pl-PL" sz="2400" dirty="0" err="1">
-                <a:solidFill>
-                  <a:schemeClr val="bg1"/>
-                </a:solidFill>
-              </a:rPr>
-              <a:t>Isakova</a:t>
+              <a:t>Eckel</a:t>
             </a:r>
             <a:endParaRPr lang="pl-PL" sz="2400" dirty="0">
               <a:solidFill>
@@ -4818,21 +7471,8 @@
                   <a:schemeClr val="bg1"/>
                 </a:solidFill>
               </a:rPr>
-              <a:t>Łączna liczba </a:t>
-            </a:r>
-            <a:r>
-              <a:rPr lang="pl-PL" sz="2400">
-                <a:solidFill>
-                  <a:schemeClr val="bg1"/>
-                </a:solidFill>
-              </a:rPr>
-              <a:t>godzin 75</a:t>
-            </a:r>
-            <a:endParaRPr lang="pl-PL" sz="2400" dirty="0">
-              <a:solidFill>
-                <a:schemeClr val="bg1"/>
-              </a:solidFill>
-            </a:endParaRPr>
+              <a:t>Łączna liczba godzin 75</a:t>
+            </a:r>
           </a:p>
           <a:p>
             <a:pPr algn="just"/>
@@ -6237,6 +8877,1345 @@
     <p:extLst>
       <p:ext uri="{BB962C8B-B14F-4D97-AF65-F5344CB8AC3E}">
         <p14:creationId xmlns:p14="http://schemas.microsoft.com/office/powerpoint/2010/main" val="1665283131"/>
+      </p:ext>
+    </p:extLst>
+  </p:cSld>
+  <p:clrMapOvr>
+    <a:masterClrMapping/>
+  </p:clrMapOvr>
+</p:sld>
+</file>
+
+<file path=ppt/slides/slide7.xml><?xml version="1.0" encoding="utf-8"?>
+<p:sld xmlns:a="http://schemas.openxmlformats.org/drawingml/2006/main" xmlns:r="http://schemas.openxmlformats.org/officeDocument/2006/relationships" xmlns:p="http://schemas.openxmlformats.org/presentationml/2006/main">
+  <p:cSld>
+    <p:bg>
+      <p:bgPr>
+        <a:blipFill dpi="0" rotWithShape="0">
+          <a:blip r:embed="rId3" cstate="print"/>
+          <a:srcRect/>
+          <a:stretch>
+            <a:fillRect/>
+          </a:stretch>
+        </a:blipFill>
+        <a:effectLst/>
+      </p:bgPr>
+    </p:bg>
+    <p:spTree>
+      <p:nvGrpSpPr>
+        <p:cNvPr id="1" name=""/>
+        <p:cNvGrpSpPr/>
+        <p:nvPr/>
+      </p:nvGrpSpPr>
+      <p:grpSpPr>
+        <a:xfrm>
+          <a:off x="0" y="0"/>
+          <a:ext cx="0" cy="0"/>
+          <a:chOff x="0" y="0"/>
+          <a:chExt cx="0" cy="0"/>
+        </a:xfrm>
+      </p:grpSpPr>
+      <p:sp>
+        <p:nvSpPr>
+          <p:cNvPr id="2" name="Rectangle 1"/>
+          <p:cNvSpPr/>
+          <p:nvPr/>
+        </p:nvSpPr>
+        <p:spPr>
+          <a:xfrm>
+            <a:off x="1979712" y="188640"/>
+            <a:ext cx="6696744" cy="492443"/>
+          </a:xfrm>
+          <a:prstGeom prst="rect">
+            <a:avLst/>
+          </a:prstGeom>
+        </p:spPr>
+        <p:txBody>
+          <a:bodyPr wrap="square">
+            <a:spAutoFit/>
+          </a:bodyPr>
+          <a:lstStyle/>
+          <a:p>
+            <a:pPr algn="ctr"/>
+            <a:r>
+              <a:rPr lang="pl-PL" sz="2600" dirty="0">
+                <a:solidFill>
+                  <a:schemeClr val="bg1"/>
+                </a:solidFill>
+                <a:latin typeface="Verdana" panose="020B0604030504040204" pitchFamily="34" charset="0"/>
+                <a:ea typeface="Verdana" panose="020B0604030504040204" pitchFamily="34" charset="0"/>
+                <a:cs typeface="Verdana" panose="020B0604030504040204" pitchFamily="34" charset="0"/>
+              </a:rPr>
+              <a:t>Kotlin – Język Przemysłowy</a:t>
+            </a:r>
+          </a:p>
+        </p:txBody>
+      </p:sp>
+      <p:sp>
+        <p:nvSpPr>
+          <p:cNvPr id="6" name="Prostokąt 5">
+            <a:extLst>
+              <a:ext uri="{FF2B5EF4-FFF2-40B4-BE49-F238E27FC236}">
+                <a16:creationId xmlns:a16="http://schemas.microsoft.com/office/drawing/2014/main" id="{CA41B780-B57E-411C-AAD5-3D3D6912F664}"/>
+              </a:ext>
+            </a:extLst>
+          </p:cNvPr>
+          <p:cNvSpPr/>
+          <p:nvPr/>
+        </p:nvSpPr>
+        <p:spPr>
+          <a:xfrm>
+            <a:off x="971600" y="829209"/>
+            <a:ext cx="8172400" cy="6021288"/>
+          </a:xfrm>
+          <a:prstGeom prst="rect">
+            <a:avLst/>
+          </a:prstGeom>
+          <a:solidFill>
+            <a:schemeClr val="tx1">
+              <a:lumMod val="75000"/>
+              <a:lumOff val="25000"/>
+            </a:schemeClr>
+          </a:solidFill>
+        </p:spPr>
+        <p:style>
+          <a:lnRef idx="1">
+            <a:schemeClr val="accent1"/>
+          </a:lnRef>
+          <a:fillRef idx="3">
+            <a:schemeClr val="accent1"/>
+          </a:fillRef>
+          <a:effectRef idx="2">
+            <a:schemeClr val="accent1"/>
+          </a:effectRef>
+          <a:fontRef idx="minor">
+            <a:schemeClr val="lt1"/>
+          </a:fontRef>
+        </p:style>
+        <p:txBody>
+          <a:bodyPr rtlCol="0" anchor="ctr"/>
+          <a:lstStyle/>
+          <a:p>
+            <a:pPr algn="ctr"/>
+            <a:endParaRPr lang="pl-PL" dirty="0"/>
+          </a:p>
+        </p:txBody>
+      </p:sp>
+      <p:sp>
+        <p:nvSpPr>
+          <p:cNvPr id="3" name="pole tekstowe 2">
+            <a:extLst>
+              <a:ext uri="{FF2B5EF4-FFF2-40B4-BE49-F238E27FC236}">
+                <a16:creationId xmlns:a16="http://schemas.microsoft.com/office/drawing/2014/main" id="{4A4EDC8D-624B-4D09-B81A-4A35B7BD53AB}"/>
+              </a:ext>
+            </a:extLst>
+          </p:cNvPr>
+          <p:cNvSpPr txBox="1"/>
+          <p:nvPr/>
+        </p:nvSpPr>
+        <p:spPr>
+          <a:xfrm>
+            <a:off x="1296144" y="1495186"/>
+            <a:ext cx="7380312" cy="4801314"/>
+          </a:xfrm>
+          <a:prstGeom prst="rect">
+            <a:avLst/>
+          </a:prstGeom>
+          <a:noFill/>
+        </p:spPr>
+        <p:txBody>
+          <a:bodyPr wrap="square" rtlCol="0">
+            <a:spAutoFit/>
+          </a:bodyPr>
+          <a:lstStyle/>
+          <a:p>
+            <a:pPr marL="285750" indent="-285750">
+              <a:buFont typeface="Arial" panose="020B0604020202020204" pitchFamily="34" charset="0"/>
+              <a:buChar char="•"/>
+            </a:pPr>
+            <a:r>
+              <a:rPr lang="pl-PL" sz="1800" b="1" i="0" dirty="0">
+                <a:solidFill>
+                  <a:schemeClr val="bg1"/>
+                </a:solidFill>
+                <a:effectLst/>
+                <a:latin typeface="OpenSans-Bold"/>
+              </a:rPr>
+              <a:t>FORTRAN: </a:t>
+            </a:r>
+            <a:r>
+              <a:rPr lang="pl-PL" sz="1800" b="1" i="0" dirty="0" err="1">
+                <a:solidFill>
+                  <a:schemeClr val="bg1"/>
+                </a:solidFill>
+                <a:effectLst/>
+                <a:latin typeface="OpenSans-Bold"/>
+              </a:rPr>
+              <a:t>FORmula</a:t>
+            </a:r>
+            <a:r>
+              <a:rPr lang="pl-PL" sz="1800" b="1" i="0" dirty="0">
+                <a:solidFill>
+                  <a:schemeClr val="bg1"/>
+                </a:solidFill>
+                <a:effectLst/>
+                <a:latin typeface="OpenSans-Bold"/>
+              </a:rPr>
+              <a:t> </a:t>
+            </a:r>
+            <a:r>
+              <a:rPr lang="pl-PL" sz="1800" b="1" i="0" dirty="0" err="1">
+                <a:solidFill>
+                  <a:schemeClr val="bg1"/>
+                </a:solidFill>
+                <a:effectLst/>
+                <a:latin typeface="OpenSans-Bold"/>
+              </a:rPr>
+              <a:t>TRANslation</a:t>
+            </a:r>
+            <a:r>
+              <a:rPr lang="pl-PL" sz="1800" b="1" i="0" dirty="0">
+                <a:solidFill>
+                  <a:schemeClr val="bg1"/>
+                </a:solidFill>
+                <a:effectLst/>
+                <a:latin typeface="OpenSans-Bold"/>
+              </a:rPr>
+              <a:t> (1957)</a:t>
+            </a:r>
+            <a:endParaRPr lang="pl-PL" sz="1800" b="1" dirty="0">
+              <a:solidFill>
+                <a:schemeClr val="bg1"/>
+              </a:solidFill>
+              <a:latin typeface="OpenSans-Bold"/>
+            </a:endParaRPr>
+          </a:p>
+          <a:p>
+            <a:pPr marL="285750" indent="-285750">
+              <a:buFont typeface="Arial" panose="020B0604020202020204" pitchFamily="34" charset="0"/>
+              <a:buChar char="•"/>
+            </a:pPr>
+            <a:r>
+              <a:rPr lang="pl-PL" sz="1800" b="1" i="0" dirty="0">
+                <a:solidFill>
+                  <a:schemeClr val="bg1"/>
+                </a:solidFill>
+                <a:effectLst/>
+                <a:latin typeface="OpenSans-Bold"/>
+              </a:rPr>
+              <a:t>LISP: </a:t>
+            </a:r>
+            <a:r>
+              <a:rPr lang="pl-PL" sz="1800" b="1" i="0" dirty="0" err="1">
+                <a:solidFill>
+                  <a:schemeClr val="bg1"/>
+                </a:solidFill>
+                <a:effectLst/>
+                <a:latin typeface="OpenSans-Bold"/>
+              </a:rPr>
+              <a:t>LISt</a:t>
+            </a:r>
+            <a:r>
+              <a:rPr lang="pl-PL" sz="1800" b="1" i="0" dirty="0">
+                <a:solidFill>
+                  <a:schemeClr val="bg1"/>
+                </a:solidFill>
+                <a:effectLst/>
+                <a:latin typeface="OpenSans-Bold"/>
+              </a:rPr>
+              <a:t> </a:t>
+            </a:r>
+            <a:r>
+              <a:rPr lang="pl-PL" sz="1800" b="1" i="0" dirty="0" err="1">
+                <a:solidFill>
+                  <a:schemeClr val="bg1"/>
+                </a:solidFill>
+                <a:effectLst/>
+                <a:latin typeface="OpenSans-Bold"/>
+              </a:rPr>
+              <a:t>Processor</a:t>
+            </a:r>
+            <a:r>
+              <a:rPr lang="pl-PL" sz="1800" b="1" i="0" dirty="0">
+                <a:solidFill>
+                  <a:schemeClr val="bg1"/>
+                </a:solidFill>
+                <a:effectLst/>
+                <a:latin typeface="OpenSans-Bold"/>
+              </a:rPr>
+              <a:t> (1958)</a:t>
+            </a:r>
+            <a:r>
+              <a:rPr lang="pl-PL" dirty="0">
+                <a:solidFill>
+                  <a:schemeClr val="bg1"/>
+                </a:solidFill>
+              </a:rPr>
+              <a:t> </a:t>
+            </a:r>
+          </a:p>
+          <a:p>
+            <a:pPr marL="285750" indent="-285750">
+              <a:buFont typeface="Arial" panose="020B0604020202020204" pitchFamily="34" charset="0"/>
+              <a:buChar char="•"/>
+            </a:pPr>
+            <a:r>
+              <a:rPr lang="pl-PL" sz="1800" b="1" i="0" dirty="0">
+                <a:solidFill>
+                  <a:schemeClr val="bg1"/>
+                </a:solidFill>
+                <a:effectLst/>
+                <a:latin typeface="OpenSans-Bold"/>
+              </a:rPr>
+              <a:t>ALGOL: </a:t>
+            </a:r>
+            <a:r>
+              <a:rPr lang="pl-PL" sz="1800" b="1" i="0" dirty="0" err="1">
+                <a:solidFill>
+                  <a:schemeClr val="bg1"/>
+                </a:solidFill>
+                <a:effectLst/>
+                <a:latin typeface="OpenSans-Bold"/>
+              </a:rPr>
+              <a:t>ALGOrithmic</a:t>
+            </a:r>
+            <a:r>
+              <a:rPr lang="pl-PL" sz="1800" b="1" i="0" dirty="0">
+                <a:solidFill>
+                  <a:schemeClr val="bg1"/>
+                </a:solidFill>
+                <a:effectLst/>
+                <a:latin typeface="OpenSans-Bold"/>
+              </a:rPr>
+              <a:t> Language (1958)</a:t>
+            </a:r>
+            <a:r>
+              <a:rPr lang="pl-PL" dirty="0">
+                <a:solidFill>
+                  <a:schemeClr val="bg1"/>
+                </a:solidFill>
+              </a:rPr>
+              <a:t> </a:t>
+            </a:r>
+          </a:p>
+          <a:p>
+            <a:pPr marL="285750" indent="-285750">
+              <a:buFont typeface="Arial" panose="020B0604020202020204" pitchFamily="34" charset="0"/>
+              <a:buChar char="•"/>
+            </a:pPr>
+            <a:r>
+              <a:rPr lang="en-US" sz="1800" b="1" i="0" dirty="0">
+                <a:solidFill>
+                  <a:schemeClr val="bg1"/>
+                </a:solidFill>
+                <a:effectLst/>
+                <a:latin typeface="OpenSans-Bold"/>
+              </a:rPr>
+              <a:t>COBOL: </a:t>
+            </a:r>
+            <a:r>
+              <a:rPr lang="en-US" sz="1800" b="1" i="0" dirty="0" err="1">
+                <a:solidFill>
+                  <a:schemeClr val="bg1"/>
+                </a:solidFill>
+                <a:effectLst/>
+                <a:latin typeface="OpenSans-Bold"/>
+              </a:rPr>
+              <a:t>COmmon</a:t>
+            </a:r>
+            <a:r>
+              <a:rPr lang="en-US" sz="1800" b="1" i="0" dirty="0">
+                <a:solidFill>
+                  <a:schemeClr val="bg1"/>
+                </a:solidFill>
+                <a:effectLst/>
+                <a:latin typeface="OpenSans-Bold"/>
+              </a:rPr>
+              <a:t> Business-Oriented Language (1959)</a:t>
+            </a:r>
+            <a:r>
+              <a:rPr lang="en-US" dirty="0">
+                <a:solidFill>
+                  <a:schemeClr val="bg1"/>
+                </a:solidFill>
+              </a:rPr>
+              <a:t> </a:t>
+            </a:r>
+            <a:endParaRPr lang="pl-PL" dirty="0">
+              <a:solidFill>
+                <a:schemeClr val="bg1"/>
+              </a:solidFill>
+            </a:endParaRPr>
+          </a:p>
+          <a:p>
+            <a:pPr marL="285750" indent="-285750">
+              <a:buFont typeface="Arial" panose="020B0604020202020204" pitchFamily="34" charset="0"/>
+              <a:buChar char="•"/>
+            </a:pPr>
+            <a:r>
+              <a:rPr lang="en-US" sz="1800" b="1" i="0" dirty="0">
+                <a:solidFill>
+                  <a:schemeClr val="bg1"/>
+                </a:solidFill>
+                <a:effectLst/>
+                <a:latin typeface="OpenSans-Bold"/>
+              </a:rPr>
+              <a:t>BASIC: Beginners’ All-purpose Symbolic Instruction</a:t>
+            </a:r>
+            <a:r>
+              <a:rPr lang="pl-PL" sz="1800" b="1" i="0" dirty="0">
+                <a:solidFill>
+                  <a:schemeClr val="bg1"/>
+                </a:solidFill>
+                <a:effectLst/>
+                <a:latin typeface="OpenSans-Bold"/>
+              </a:rPr>
+              <a:t> </a:t>
+            </a:r>
+            <a:r>
+              <a:rPr lang="en-US" sz="1800" b="1" i="0" dirty="0">
+                <a:solidFill>
+                  <a:schemeClr val="bg1"/>
+                </a:solidFill>
+                <a:effectLst/>
+                <a:latin typeface="OpenSans-Bold"/>
+              </a:rPr>
+              <a:t>Code (1964)</a:t>
+            </a:r>
+            <a:r>
+              <a:rPr lang="en-US" dirty="0">
+                <a:solidFill>
+                  <a:schemeClr val="bg1"/>
+                </a:solidFill>
+              </a:rPr>
+              <a:t> </a:t>
+            </a:r>
+            <a:endParaRPr lang="pl-PL" dirty="0">
+              <a:solidFill>
+                <a:schemeClr val="bg1"/>
+              </a:solidFill>
+            </a:endParaRPr>
+          </a:p>
+          <a:p>
+            <a:pPr marL="285750" indent="-285750">
+              <a:buFont typeface="Arial" panose="020B0604020202020204" pitchFamily="34" charset="0"/>
+              <a:buChar char="•"/>
+            </a:pPr>
+            <a:r>
+              <a:rPr lang="en-US" sz="1800" b="1" i="0" dirty="0" err="1">
+                <a:solidFill>
+                  <a:schemeClr val="bg1"/>
+                </a:solidFill>
+                <a:effectLst/>
+                <a:latin typeface="OpenSans-Bold"/>
+              </a:rPr>
+              <a:t>Simula</a:t>
+            </a:r>
+            <a:r>
+              <a:rPr lang="en-US" sz="1800" b="1" i="0" dirty="0">
+                <a:solidFill>
+                  <a:schemeClr val="bg1"/>
+                </a:solidFill>
+                <a:effectLst/>
+                <a:latin typeface="OpenSans-Bold"/>
+              </a:rPr>
+              <a:t> 67, the Original Object-Oriented Language</a:t>
+            </a:r>
+            <a:r>
+              <a:rPr lang="pl-PL" sz="1800" b="1" i="0" dirty="0">
+                <a:solidFill>
+                  <a:schemeClr val="bg1"/>
+                </a:solidFill>
+                <a:effectLst/>
+                <a:latin typeface="OpenSans-Bold"/>
+              </a:rPr>
+              <a:t> </a:t>
+            </a:r>
+            <a:r>
+              <a:rPr lang="en-US" sz="1800" b="1" i="0" dirty="0">
+                <a:solidFill>
+                  <a:schemeClr val="bg1"/>
+                </a:solidFill>
+                <a:effectLst/>
+                <a:latin typeface="OpenSans-Bold"/>
+              </a:rPr>
+              <a:t>(1967)</a:t>
+            </a:r>
+            <a:r>
+              <a:rPr lang="en-US" dirty="0">
+                <a:solidFill>
+                  <a:schemeClr val="bg1"/>
+                </a:solidFill>
+              </a:rPr>
+              <a:t> </a:t>
+            </a:r>
+            <a:endParaRPr lang="pl-PL" dirty="0">
+              <a:solidFill>
+                <a:schemeClr val="bg1"/>
+              </a:solidFill>
+            </a:endParaRPr>
+          </a:p>
+          <a:p>
+            <a:pPr marL="285750" indent="-285750">
+              <a:buFont typeface="Arial" panose="020B0604020202020204" pitchFamily="34" charset="0"/>
+              <a:buChar char="•"/>
+            </a:pPr>
+            <a:r>
+              <a:rPr lang="pl-PL" sz="1800" b="1" i="0" dirty="0">
+                <a:solidFill>
+                  <a:schemeClr val="bg1"/>
+                </a:solidFill>
+                <a:effectLst/>
+                <a:latin typeface="OpenSans-Bold"/>
+              </a:rPr>
+              <a:t>Pascal (1970)</a:t>
+            </a:r>
+            <a:r>
+              <a:rPr lang="pl-PL" dirty="0">
+                <a:solidFill>
+                  <a:schemeClr val="bg1"/>
+                </a:solidFill>
+              </a:rPr>
+              <a:t> </a:t>
+            </a:r>
+          </a:p>
+          <a:p>
+            <a:pPr marL="285750" indent="-285750">
+              <a:buFont typeface="Arial" panose="020B0604020202020204" pitchFamily="34" charset="0"/>
+              <a:buChar char="•"/>
+            </a:pPr>
+            <a:r>
+              <a:rPr lang="pl-PL" sz="1800" b="1" i="0" dirty="0">
+                <a:solidFill>
+                  <a:schemeClr val="bg1"/>
+                </a:solidFill>
+                <a:effectLst/>
+                <a:latin typeface="OpenSans-Bold"/>
+              </a:rPr>
+              <a:t>C (1972)</a:t>
+            </a:r>
+            <a:r>
+              <a:rPr lang="pl-PL" dirty="0">
+                <a:solidFill>
+                  <a:schemeClr val="bg1"/>
+                </a:solidFill>
+              </a:rPr>
+              <a:t> </a:t>
+            </a:r>
+          </a:p>
+          <a:p>
+            <a:pPr marL="285750" indent="-285750">
+              <a:buFont typeface="Arial" panose="020B0604020202020204" pitchFamily="34" charset="0"/>
+              <a:buChar char="•"/>
+            </a:pPr>
+            <a:r>
+              <a:rPr lang="pl-PL" sz="1800" b="1" i="0" dirty="0" err="1">
+                <a:solidFill>
+                  <a:schemeClr val="bg1"/>
+                </a:solidFill>
+                <a:effectLst/>
+                <a:latin typeface="OpenSans-Bold"/>
+              </a:rPr>
+              <a:t>Smalltalk</a:t>
+            </a:r>
+            <a:r>
+              <a:rPr lang="pl-PL" sz="1800" b="1" i="0" dirty="0">
+                <a:solidFill>
+                  <a:schemeClr val="bg1"/>
+                </a:solidFill>
+                <a:effectLst/>
+                <a:latin typeface="OpenSans-Bold"/>
+              </a:rPr>
+              <a:t> (1972)</a:t>
+            </a:r>
+            <a:r>
+              <a:rPr lang="pl-PL" dirty="0">
+                <a:solidFill>
+                  <a:schemeClr val="bg1"/>
+                </a:solidFill>
+              </a:rPr>
+              <a:t> </a:t>
+            </a:r>
+          </a:p>
+          <a:p>
+            <a:pPr marL="285750" indent="-285750">
+              <a:buFont typeface="Arial" panose="020B0604020202020204" pitchFamily="34" charset="0"/>
+              <a:buChar char="•"/>
+            </a:pPr>
+            <a:r>
+              <a:rPr lang="en-US" sz="1800" b="1" i="0" dirty="0">
+                <a:solidFill>
+                  <a:schemeClr val="bg1"/>
+                </a:solidFill>
+                <a:effectLst/>
+                <a:latin typeface="OpenSans-Bold"/>
+              </a:rPr>
+              <a:t>C++: A Better C with Objects (1983)</a:t>
+            </a:r>
+            <a:r>
+              <a:rPr lang="en-US" dirty="0">
+                <a:solidFill>
+                  <a:schemeClr val="bg1"/>
+                </a:solidFill>
+              </a:rPr>
+              <a:t> </a:t>
+            </a:r>
+            <a:endParaRPr lang="pl-PL" dirty="0">
+              <a:solidFill>
+                <a:schemeClr val="bg1"/>
+              </a:solidFill>
+            </a:endParaRPr>
+          </a:p>
+          <a:p>
+            <a:pPr marL="285750" indent="-285750">
+              <a:buFont typeface="Arial" panose="020B0604020202020204" pitchFamily="34" charset="0"/>
+              <a:buChar char="•"/>
+            </a:pPr>
+            <a:r>
+              <a:rPr lang="en-US" sz="1800" b="1" i="0" dirty="0">
+                <a:solidFill>
+                  <a:schemeClr val="bg1"/>
+                </a:solidFill>
+                <a:effectLst/>
+                <a:latin typeface="OpenSans-Bold"/>
+              </a:rPr>
+              <a:t>Python: (1990)</a:t>
+            </a:r>
+            <a:r>
+              <a:rPr lang="en-US" dirty="0">
+                <a:solidFill>
+                  <a:schemeClr val="bg1"/>
+                </a:solidFill>
+              </a:rPr>
+              <a:t> </a:t>
+            </a:r>
+            <a:endParaRPr lang="pl-PL" dirty="0">
+              <a:solidFill>
+                <a:schemeClr val="bg1"/>
+              </a:solidFill>
+            </a:endParaRPr>
+          </a:p>
+          <a:p>
+            <a:pPr marL="285750" indent="-285750">
+              <a:buFont typeface="Arial" panose="020B0604020202020204" pitchFamily="34" charset="0"/>
+              <a:buChar char="•"/>
+            </a:pPr>
+            <a:r>
+              <a:rPr lang="en-US" sz="1800" b="1" i="0" dirty="0">
+                <a:solidFill>
+                  <a:schemeClr val="bg1"/>
+                </a:solidFill>
+                <a:effectLst/>
+                <a:latin typeface="OpenSans-Bold"/>
+              </a:rPr>
+              <a:t>Haskell: Pure Functional Programming (1990)</a:t>
+            </a:r>
+            <a:endParaRPr lang="pl-PL" sz="1800" b="1" dirty="0">
+              <a:solidFill>
+                <a:schemeClr val="bg1"/>
+              </a:solidFill>
+              <a:latin typeface="OpenSans-Bold"/>
+            </a:endParaRPr>
+          </a:p>
+          <a:p>
+            <a:pPr marL="285750" indent="-285750">
+              <a:buFont typeface="Arial" panose="020B0604020202020204" pitchFamily="34" charset="0"/>
+              <a:buChar char="•"/>
+            </a:pPr>
+            <a:r>
+              <a:rPr lang="en-US" sz="1800" b="1" i="0" dirty="0">
+                <a:solidFill>
+                  <a:schemeClr val="bg1"/>
+                </a:solidFill>
+                <a:effectLst/>
+                <a:latin typeface="OpenSans-Bold"/>
+              </a:rPr>
+              <a:t>Java: Virtual Machines and Garbage Collection (1995)</a:t>
+            </a:r>
+            <a:r>
+              <a:rPr lang="en-US" dirty="0">
+                <a:solidFill>
+                  <a:schemeClr val="bg1"/>
+                </a:solidFill>
+              </a:rPr>
+              <a:t> </a:t>
+            </a:r>
+            <a:endParaRPr lang="pl-PL" dirty="0">
+              <a:solidFill>
+                <a:schemeClr val="bg1"/>
+              </a:solidFill>
+            </a:endParaRPr>
+          </a:p>
+          <a:p>
+            <a:pPr marL="285750" indent="-285750">
+              <a:buFont typeface="Arial" panose="020B0604020202020204" pitchFamily="34" charset="0"/>
+              <a:buChar char="•"/>
+            </a:pPr>
+            <a:r>
+              <a:rPr lang="pl-PL" sz="1800" b="1" i="0" dirty="0">
+                <a:solidFill>
+                  <a:schemeClr val="bg1"/>
+                </a:solidFill>
+                <a:effectLst/>
+                <a:latin typeface="OpenSans-Bold"/>
+              </a:rPr>
+              <a:t>JavaScript:  (1995)</a:t>
+            </a:r>
+          </a:p>
+          <a:p>
+            <a:pPr marL="285750" indent="-285750">
+              <a:buFont typeface="Arial" panose="020B0604020202020204" pitchFamily="34" charset="0"/>
+              <a:buChar char="•"/>
+            </a:pPr>
+            <a:r>
+              <a:rPr lang="nn-NO" sz="1800" b="1" i="0" dirty="0">
+                <a:solidFill>
+                  <a:schemeClr val="bg1"/>
+                </a:solidFill>
+                <a:effectLst/>
+                <a:latin typeface="OpenSans-Bold"/>
+              </a:rPr>
+              <a:t>C#: (2000)</a:t>
+            </a:r>
+            <a:endParaRPr lang="pl-PL" sz="1800" b="1" i="0" dirty="0">
+              <a:solidFill>
+                <a:schemeClr val="bg1"/>
+              </a:solidFill>
+              <a:effectLst/>
+              <a:latin typeface="OpenSans-Bold"/>
+            </a:endParaRPr>
+          </a:p>
+          <a:p>
+            <a:pPr marL="285750" indent="-285750">
+              <a:buFont typeface="Arial" panose="020B0604020202020204" pitchFamily="34" charset="0"/>
+              <a:buChar char="•"/>
+            </a:pPr>
+            <a:r>
+              <a:rPr lang="pl-PL" sz="1800" b="1" i="0" dirty="0">
+                <a:solidFill>
+                  <a:schemeClr val="bg1"/>
+                </a:solidFill>
+                <a:effectLst/>
+                <a:latin typeface="OpenSans-Bold"/>
+              </a:rPr>
+              <a:t>Scala: (2003)</a:t>
+            </a:r>
+          </a:p>
+          <a:p>
+            <a:pPr marL="285750" indent="-285750">
+              <a:buFont typeface="Arial" panose="020B0604020202020204" pitchFamily="34" charset="0"/>
+              <a:buChar char="•"/>
+            </a:pPr>
+            <a:r>
+              <a:rPr lang="en-US" sz="1800" b="1" i="0" dirty="0">
+                <a:solidFill>
+                  <a:schemeClr val="bg1"/>
+                </a:solidFill>
+                <a:effectLst/>
+                <a:latin typeface="OpenSans-Bold"/>
+              </a:rPr>
+              <a:t>Groovy: (2007)</a:t>
+            </a:r>
+            <a:endParaRPr lang="pl-PL" dirty="0">
+              <a:solidFill>
+                <a:schemeClr val="bg1"/>
+              </a:solidFill>
+            </a:endParaRPr>
+          </a:p>
+        </p:txBody>
+      </p:sp>
+      <p:sp>
+        <p:nvSpPr>
+          <p:cNvPr id="4" name="pole tekstowe 3">
+            <a:extLst>
+              <a:ext uri="{FF2B5EF4-FFF2-40B4-BE49-F238E27FC236}">
+                <a16:creationId xmlns:a16="http://schemas.microsoft.com/office/drawing/2014/main" id="{C70CBCE9-0700-48B0-95BA-91932375B43E}"/>
+              </a:ext>
+            </a:extLst>
+          </p:cNvPr>
+          <p:cNvSpPr txBox="1"/>
+          <p:nvPr/>
+        </p:nvSpPr>
+        <p:spPr>
+          <a:xfrm>
+            <a:off x="1984321" y="839032"/>
+            <a:ext cx="7052176" cy="646331"/>
+          </a:xfrm>
+          <a:prstGeom prst="rect">
+            <a:avLst/>
+          </a:prstGeom>
+          <a:noFill/>
+        </p:spPr>
+        <p:txBody>
+          <a:bodyPr wrap="square" rtlCol="0">
+            <a:spAutoFit/>
+          </a:bodyPr>
+          <a:lstStyle/>
+          <a:p>
+            <a:r>
+              <a:rPr lang="en-US" sz="2400" b="1" i="0" dirty="0">
+                <a:solidFill>
+                  <a:schemeClr val="bg1"/>
+                </a:solidFill>
+                <a:effectLst/>
+                <a:latin typeface="OpenSans-Bold"/>
+              </a:rPr>
+              <a:t>Kotlin (Introduced 2011, Version 1.0:</a:t>
+            </a:r>
+            <a:r>
+              <a:rPr lang="pl-PL" sz="2400" b="1" i="0" dirty="0">
+                <a:solidFill>
+                  <a:schemeClr val="bg1"/>
+                </a:solidFill>
+                <a:effectLst/>
+                <a:latin typeface="OpenSans-Bold"/>
+              </a:rPr>
+              <a:t> </a:t>
+            </a:r>
+            <a:r>
+              <a:rPr lang="en-US" sz="2400" b="1" i="0" dirty="0">
+                <a:solidFill>
+                  <a:schemeClr val="bg1"/>
+                </a:solidFill>
+                <a:effectLst/>
+                <a:latin typeface="OpenSans-Bold"/>
+              </a:rPr>
+              <a:t>2016)</a:t>
+            </a:r>
+            <a:r>
+              <a:rPr lang="en-US" sz="1600" dirty="0">
+                <a:solidFill>
+                  <a:schemeClr val="bg1"/>
+                </a:solidFill>
+              </a:rPr>
+              <a:t> </a:t>
+            </a:r>
+            <a:br>
+              <a:rPr lang="en-US" dirty="0">
+                <a:solidFill>
+                  <a:schemeClr val="bg1"/>
+                </a:solidFill>
+              </a:rPr>
+            </a:br>
+            <a:endParaRPr lang="pl-PL" dirty="0">
+              <a:solidFill>
+                <a:schemeClr val="bg1"/>
+              </a:solidFill>
+            </a:endParaRPr>
+          </a:p>
+        </p:txBody>
+      </p:sp>
+    </p:spTree>
+    <p:extLst>
+      <p:ext uri="{BB962C8B-B14F-4D97-AF65-F5344CB8AC3E}">
+        <p14:creationId xmlns:p14="http://schemas.microsoft.com/office/powerpoint/2010/main" val="2236679113"/>
+      </p:ext>
+    </p:extLst>
+  </p:cSld>
+  <p:clrMapOvr>
+    <a:masterClrMapping/>
+  </p:clrMapOvr>
+</p:sld>
+</file>
+
+<file path=ppt/slides/slide8.xml><?xml version="1.0" encoding="utf-8"?>
+<p:sld xmlns:a="http://schemas.openxmlformats.org/drawingml/2006/main" xmlns:r="http://schemas.openxmlformats.org/officeDocument/2006/relationships" xmlns:p="http://schemas.openxmlformats.org/presentationml/2006/main">
+  <p:cSld>
+    <p:bg>
+      <p:bgPr>
+        <a:blipFill dpi="0" rotWithShape="0">
+          <a:blip r:embed="rId3" cstate="print"/>
+          <a:srcRect/>
+          <a:stretch>
+            <a:fillRect/>
+          </a:stretch>
+        </a:blipFill>
+        <a:effectLst/>
+      </p:bgPr>
+    </p:bg>
+    <p:spTree>
+      <p:nvGrpSpPr>
+        <p:cNvPr id="1" name=""/>
+        <p:cNvGrpSpPr/>
+        <p:nvPr/>
+      </p:nvGrpSpPr>
+      <p:grpSpPr>
+        <a:xfrm>
+          <a:off x="0" y="0"/>
+          <a:ext cx="0" cy="0"/>
+          <a:chOff x="0" y="0"/>
+          <a:chExt cx="0" cy="0"/>
+        </a:xfrm>
+      </p:grpSpPr>
+      <p:sp>
+        <p:nvSpPr>
+          <p:cNvPr id="2" name="Rectangle 1"/>
+          <p:cNvSpPr/>
+          <p:nvPr/>
+        </p:nvSpPr>
+        <p:spPr>
+          <a:xfrm>
+            <a:off x="1979712" y="188640"/>
+            <a:ext cx="6696744" cy="492443"/>
+          </a:xfrm>
+          <a:prstGeom prst="rect">
+            <a:avLst/>
+          </a:prstGeom>
+        </p:spPr>
+        <p:txBody>
+          <a:bodyPr wrap="square">
+            <a:spAutoFit/>
+          </a:bodyPr>
+          <a:lstStyle/>
+          <a:p>
+            <a:pPr algn="ctr"/>
+            <a:r>
+              <a:rPr lang="pl-PL" sz="2600" dirty="0">
+                <a:solidFill>
+                  <a:schemeClr val="bg1"/>
+                </a:solidFill>
+                <a:latin typeface="Verdana" panose="020B0604030504040204" pitchFamily="34" charset="0"/>
+                <a:ea typeface="Verdana" panose="020B0604030504040204" pitchFamily="34" charset="0"/>
+                <a:cs typeface="Verdana" panose="020B0604030504040204" pitchFamily="34" charset="0"/>
+              </a:rPr>
+              <a:t>JVM, JRE, JDK</a:t>
+            </a:r>
+          </a:p>
+        </p:txBody>
+      </p:sp>
+      <p:sp>
+        <p:nvSpPr>
+          <p:cNvPr id="6" name="Prostokąt 5">
+            <a:extLst>
+              <a:ext uri="{FF2B5EF4-FFF2-40B4-BE49-F238E27FC236}">
+                <a16:creationId xmlns:a16="http://schemas.microsoft.com/office/drawing/2014/main" id="{CA41B780-B57E-411C-AAD5-3D3D6912F664}"/>
+              </a:ext>
+            </a:extLst>
+          </p:cNvPr>
+          <p:cNvSpPr/>
+          <p:nvPr/>
+        </p:nvSpPr>
+        <p:spPr>
+          <a:xfrm>
+            <a:off x="971600" y="836712"/>
+            <a:ext cx="8172400" cy="6021288"/>
+          </a:xfrm>
+          <a:prstGeom prst="rect">
+            <a:avLst/>
+          </a:prstGeom>
+          <a:solidFill>
+            <a:schemeClr val="tx1">
+              <a:lumMod val="75000"/>
+              <a:lumOff val="25000"/>
+            </a:schemeClr>
+          </a:solidFill>
+        </p:spPr>
+        <p:style>
+          <a:lnRef idx="1">
+            <a:schemeClr val="accent1"/>
+          </a:lnRef>
+          <a:fillRef idx="3">
+            <a:schemeClr val="accent1"/>
+          </a:fillRef>
+          <a:effectRef idx="2">
+            <a:schemeClr val="accent1"/>
+          </a:effectRef>
+          <a:fontRef idx="minor">
+            <a:schemeClr val="lt1"/>
+          </a:fontRef>
+        </p:style>
+        <p:txBody>
+          <a:bodyPr rtlCol="0" anchor="ctr"/>
+          <a:lstStyle/>
+          <a:p>
+            <a:pPr algn="ctr"/>
+            <a:endParaRPr lang="pl-PL" dirty="0"/>
+          </a:p>
+        </p:txBody>
+      </p:sp>
+      <p:sp>
+        <p:nvSpPr>
+          <p:cNvPr id="7" name="pole tekstowe 6">
+            <a:extLst>
+              <a:ext uri="{FF2B5EF4-FFF2-40B4-BE49-F238E27FC236}">
+                <a16:creationId xmlns:a16="http://schemas.microsoft.com/office/drawing/2014/main" id="{3DAA5B31-D812-4C7C-84FF-95B9AF53F617}"/>
+              </a:ext>
+            </a:extLst>
+          </p:cNvPr>
+          <p:cNvSpPr txBox="1"/>
+          <p:nvPr/>
+        </p:nvSpPr>
+        <p:spPr>
+          <a:xfrm>
+            <a:off x="980784" y="855016"/>
+            <a:ext cx="7884368" cy="4893647"/>
+          </a:xfrm>
+          <a:prstGeom prst="rect">
+            <a:avLst/>
+          </a:prstGeom>
+          <a:noFill/>
+        </p:spPr>
+        <p:txBody>
+          <a:bodyPr wrap="square">
+            <a:spAutoFit/>
+          </a:bodyPr>
+          <a:lstStyle/>
+          <a:p>
+            <a:pPr algn="just"/>
+            <a:r>
+              <a:rPr lang="pl-PL" sz="2400" b="1" i="0" dirty="0">
+                <a:solidFill>
+                  <a:schemeClr val="bg1"/>
+                </a:solidFill>
+                <a:effectLst/>
+                <a:latin typeface="Times New Roman" panose="02020603050405020304" pitchFamily="18" charset="0"/>
+                <a:cs typeface="Times New Roman" panose="02020603050405020304" pitchFamily="18" charset="0"/>
+              </a:rPr>
+              <a:t>JDK</a:t>
+            </a:r>
+            <a:r>
+              <a:rPr lang="pl-PL" sz="2400" b="0" i="0" dirty="0">
+                <a:solidFill>
+                  <a:schemeClr val="bg1"/>
+                </a:solidFill>
+                <a:effectLst/>
+                <a:latin typeface="Times New Roman" panose="02020603050405020304" pitchFamily="18" charset="0"/>
+                <a:cs typeface="Times New Roman" panose="02020603050405020304" pitchFamily="18" charset="0"/>
+              </a:rPr>
+              <a:t> (</a:t>
+            </a:r>
+            <a:r>
+              <a:rPr lang="pl-PL" sz="2400" b="1" i="0" dirty="0">
+                <a:solidFill>
+                  <a:schemeClr val="bg1"/>
+                </a:solidFill>
+                <a:effectLst/>
+                <a:latin typeface="Times New Roman" panose="02020603050405020304" pitchFamily="18" charset="0"/>
+                <a:cs typeface="Times New Roman" panose="02020603050405020304" pitchFamily="18" charset="0"/>
+              </a:rPr>
+              <a:t>Java Development Kit</a:t>
+            </a:r>
+            <a:r>
+              <a:rPr lang="pl-PL" sz="2400" b="0" i="0" dirty="0">
+                <a:solidFill>
+                  <a:schemeClr val="bg1"/>
+                </a:solidFill>
+                <a:effectLst/>
+                <a:latin typeface="Times New Roman" panose="02020603050405020304" pitchFamily="18" charset="0"/>
+                <a:cs typeface="Times New Roman" panose="02020603050405020304" pitchFamily="18" charset="0"/>
+              </a:rPr>
+              <a:t>) </a:t>
+            </a:r>
+            <a:r>
+              <a:rPr lang="pl-PL" sz="2400" dirty="0">
+                <a:solidFill>
+                  <a:schemeClr val="bg1"/>
+                </a:solidFill>
+                <a:latin typeface="Times New Roman" panose="02020603050405020304" pitchFamily="18" charset="0"/>
+                <a:cs typeface="Times New Roman" panose="02020603050405020304" pitchFamily="18" charset="0"/>
+              </a:rPr>
+              <a:t>- </a:t>
+            </a:r>
+            <a:r>
+              <a:rPr lang="pl-PL" sz="2400" b="0" i="0" dirty="0">
+                <a:solidFill>
+                  <a:schemeClr val="bg1"/>
+                </a:solidFill>
+                <a:effectLst/>
+                <a:latin typeface="Times New Roman" panose="02020603050405020304" pitchFamily="18" charset="0"/>
+                <a:cs typeface="Times New Roman" panose="02020603050405020304" pitchFamily="18" charset="0"/>
+              </a:rPr>
+              <a:t>Pakiet Programisty Javy. JDK  zawiera Środowisko Uruchomieniowe Javy (tzn. JRE) oraz zestaw narzędzi niezbędnych do wytwarzania oraz kompilowania oprogramowania tworzonego w języku JAVA.</a:t>
+            </a:r>
+          </a:p>
+          <a:p>
+            <a:pPr algn="just"/>
+            <a:r>
+              <a:rPr lang="pl-PL" sz="2400" b="0" i="0" dirty="0">
+                <a:solidFill>
+                  <a:schemeClr val="bg1"/>
+                </a:solidFill>
+                <a:effectLst/>
+                <a:latin typeface="Times New Roman" panose="02020603050405020304" pitchFamily="18" charset="0"/>
+                <a:cs typeface="Times New Roman" panose="02020603050405020304" pitchFamily="18" charset="0"/>
+              </a:rPr>
+              <a:t> </a:t>
+            </a:r>
+          </a:p>
+          <a:p>
+            <a:pPr algn="just"/>
+            <a:r>
+              <a:rPr lang="pl-PL" sz="2400" b="1" i="0" dirty="0">
+                <a:solidFill>
+                  <a:schemeClr val="bg1"/>
+                </a:solidFill>
+                <a:effectLst/>
+                <a:latin typeface="Times New Roman" panose="02020603050405020304" pitchFamily="18" charset="0"/>
+                <a:cs typeface="Times New Roman" panose="02020603050405020304" pitchFamily="18" charset="0"/>
+              </a:rPr>
+              <a:t>JRE</a:t>
+            </a:r>
+            <a:r>
+              <a:rPr lang="pl-PL" sz="2400" b="0" i="0" dirty="0">
+                <a:solidFill>
+                  <a:schemeClr val="bg1"/>
+                </a:solidFill>
+                <a:effectLst/>
+                <a:latin typeface="Times New Roman" panose="02020603050405020304" pitchFamily="18" charset="0"/>
+                <a:cs typeface="Times New Roman" panose="02020603050405020304" pitchFamily="18" charset="0"/>
+              </a:rPr>
+              <a:t> (</a:t>
+            </a:r>
+            <a:r>
+              <a:rPr lang="pl-PL" sz="2400" b="1" i="0" dirty="0">
+                <a:solidFill>
+                  <a:schemeClr val="bg1"/>
+                </a:solidFill>
+                <a:effectLst/>
+                <a:latin typeface="Times New Roman" panose="02020603050405020304" pitchFamily="18" charset="0"/>
+                <a:cs typeface="Times New Roman" panose="02020603050405020304" pitchFamily="18" charset="0"/>
+              </a:rPr>
+              <a:t>Java Runtime Environment</a:t>
+            </a:r>
+            <a:r>
+              <a:rPr lang="pl-PL" sz="2400" b="0" i="0" dirty="0">
+                <a:solidFill>
+                  <a:schemeClr val="bg1"/>
+                </a:solidFill>
+                <a:effectLst/>
+                <a:latin typeface="Times New Roman" panose="02020603050405020304" pitchFamily="18" charset="0"/>
+                <a:cs typeface="Times New Roman" panose="02020603050405020304" pitchFamily="18" charset="0"/>
+              </a:rPr>
+              <a:t>) - Środowisko Uruchomieniowe Javy. W skład JRE wchodzi Wirtualna Maszyna Javy (JVM) + zbiór klas oraz narzędzi wymaganych do uruchomienia aplikacji wytworzonych w języku JAVA. </a:t>
+            </a:r>
+          </a:p>
+          <a:p>
+            <a:pPr algn="just"/>
+            <a:endParaRPr lang="pl-PL" sz="2400" b="0" i="0" dirty="0">
+              <a:solidFill>
+                <a:schemeClr val="bg1"/>
+              </a:solidFill>
+              <a:effectLst/>
+              <a:latin typeface="Times New Roman" panose="02020603050405020304" pitchFamily="18" charset="0"/>
+              <a:cs typeface="Times New Roman" panose="02020603050405020304" pitchFamily="18" charset="0"/>
+            </a:endParaRPr>
+          </a:p>
+          <a:p>
+            <a:pPr algn="just"/>
+            <a:r>
+              <a:rPr lang="pl-PL" sz="2400" b="1" i="0" dirty="0">
+                <a:solidFill>
+                  <a:schemeClr val="bg1"/>
+                </a:solidFill>
+                <a:effectLst/>
+                <a:latin typeface="Times New Roman" panose="02020603050405020304" pitchFamily="18" charset="0"/>
+                <a:cs typeface="Times New Roman" panose="02020603050405020304" pitchFamily="18" charset="0"/>
+              </a:rPr>
+              <a:t>JVM (Java Virtual Machine)</a:t>
+            </a:r>
+            <a:r>
+              <a:rPr lang="pl-PL" sz="2400" dirty="0">
+                <a:solidFill>
+                  <a:schemeClr val="bg1"/>
+                </a:solidFill>
+                <a:latin typeface="Times New Roman" panose="02020603050405020304" pitchFamily="18" charset="0"/>
+                <a:cs typeface="Times New Roman" panose="02020603050405020304" pitchFamily="18" charset="0"/>
+              </a:rPr>
+              <a:t> -</a:t>
+            </a:r>
+            <a:r>
+              <a:rPr lang="pl-PL" sz="2400" b="0" i="0" dirty="0">
+                <a:solidFill>
+                  <a:schemeClr val="bg1"/>
+                </a:solidFill>
+                <a:effectLst/>
+                <a:latin typeface="Times New Roman" panose="02020603050405020304" pitchFamily="18" charset="0"/>
+                <a:cs typeface="Times New Roman" panose="02020603050405020304" pitchFamily="18" charset="0"/>
+              </a:rPr>
+              <a:t> Wirtualna Maszyna Javy. Środowisko zdolne do wykonywania skompilowanego kodu aplikacji (kod bajtowy Javy).</a:t>
+            </a:r>
+          </a:p>
+        </p:txBody>
+      </p:sp>
+    </p:spTree>
+    <p:extLst>
+      <p:ext uri="{BB962C8B-B14F-4D97-AF65-F5344CB8AC3E}">
+        <p14:creationId xmlns:p14="http://schemas.microsoft.com/office/powerpoint/2010/main" val="24567643"/>
+      </p:ext>
+    </p:extLst>
+  </p:cSld>
+  <p:clrMapOvr>
+    <a:masterClrMapping/>
+  </p:clrMapOvr>
+</p:sld>
+</file>
+
+<file path=ppt/slides/slide9.xml><?xml version="1.0" encoding="utf-8"?>
+<p:sld xmlns:a="http://schemas.openxmlformats.org/drawingml/2006/main" xmlns:r="http://schemas.openxmlformats.org/officeDocument/2006/relationships" xmlns:p="http://schemas.openxmlformats.org/presentationml/2006/main">
+  <p:cSld>
+    <p:bg>
+      <p:bgPr>
+        <a:blipFill dpi="0" rotWithShape="0">
+          <a:blip r:embed="rId3" cstate="print"/>
+          <a:srcRect/>
+          <a:stretch>
+            <a:fillRect/>
+          </a:stretch>
+        </a:blipFill>
+        <a:effectLst/>
+      </p:bgPr>
+    </p:bg>
+    <p:spTree>
+      <p:nvGrpSpPr>
+        <p:cNvPr id="1" name=""/>
+        <p:cNvGrpSpPr/>
+        <p:nvPr/>
+      </p:nvGrpSpPr>
+      <p:grpSpPr>
+        <a:xfrm>
+          <a:off x="0" y="0"/>
+          <a:ext cx="0" cy="0"/>
+          <a:chOff x="0" y="0"/>
+          <a:chExt cx="0" cy="0"/>
+        </a:xfrm>
+      </p:grpSpPr>
+      <p:sp>
+        <p:nvSpPr>
+          <p:cNvPr id="2" name="Rectangle 1"/>
+          <p:cNvSpPr/>
+          <p:nvPr/>
+        </p:nvSpPr>
+        <p:spPr>
+          <a:xfrm>
+            <a:off x="1979712" y="188640"/>
+            <a:ext cx="6696744" cy="492443"/>
+          </a:xfrm>
+          <a:prstGeom prst="rect">
+            <a:avLst/>
+          </a:prstGeom>
+        </p:spPr>
+        <p:txBody>
+          <a:bodyPr wrap="square">
+            <a:spAutoFit/>
+          </a:bodyPr>
+          <a:lstStyle/>
+          <a:p>
+            <a:pPr algn="ctr"/>
+            <a:r>
+              <a:rPr lang="pl-PL" sz="2600" dirty="0">
+                <a:solidFill>
+                  <a:schemeClr val="bg1"/>
+                </a:solidFill>
+                <a:latin typeface="Verdana" panose="020B0604030504040204" pitchFamily="34" charset="0"/>
+                <a:ea typeface="Verdana" panose="020B0604030504040204" pitchFamily="34" charset="0"/>
+                <a:cs typeface="Verdana" panose="020B0604030504040204" pitchFamily="34" charset="0"/>
+              </a:rPr>
+              <a:t>Interoperacyjność</a:t>
+            </a:r>
+          </a:p>
+        </p:txBody>
+      </p:sp>
+      <p:sp>
+        <p:nvSpPr>
+          <p:cNvPr id="6" name="Prostokąt 5">
+            <a:extLst>
+              <a:ext uri="{FF2B5EF4-FFF2-40B4-BE49-F238E27FC236}">
+                <a16:creationId xmlns:a16="http://schemas.microsoft.com/office/drawing/2014/main" id="{CA41B780-B57E-411C-AAD5-3D3D6912F664}"/>
+              </a:ext>
+            </a:extLst>
+          </p:cNvPr>
+          <p:cNvSpPr/>
+          <p:nvPr/>
+        </p:nvSpPr>
+        <p:spPr>
+          <a:xfrm>
+            <a:off x="970062" y="836712"/>
+            <a:ext cx="8172400" cy="6021288"/>
+          </a:xfrm>
+          <a:prstGeom prst="rect">
+            <a:avLst/>
+          </a:prstGeom>
+          <a:solidFill>
+            <a:schemeClr val="tx1">
+              <a:lumMod val="75000"/>
+              <a:lumOff val="25000"/>
+            </a:schemeClr>
+          </a:solidFill>
+        </p:spPr>
+        <p:style>
+          <a:lnRef idx="1">
+            <a:schemeClr val="accent1"/>
+          </a:lnRef>
+          <a:fillRef idx="3">
+            <a:schemeClr val="accent1"/>
+          </a:fillRef>
+          <a:effectRef idx="2">
+            <a:schemeClr val="accent1"/>
+          </a:effectRef>
+          <a:fontRef idx="minor">
+            <a:schemeClr val="lt1"/>
+          </a:fontRef>
+        </p:style>
+        <p:txBody>
+          <a:bodyPr rtlCol="0" anchor="ctr"/>
+          <a:lstStyle/>
+          <a:p>
+            <a:pPr algn="ctr"/>
+            <a:endParaRPr lang="pl-PL"/>
+          </a:p>
+        </p:txBody>
+      </p:sp>
+      <p:pic>
+        <p:nvPicPr>
+          <p:cNvPr id="1026" name="Picture 2" descr="Process of compiling Android app with Java/Kotlin code | by Ban Markovic |  Medium">
+            <a:extLst>
+              <a:ext uri="{FF2B5EF4-FFF2-40B4-BE49-F238E27FC236}">
+                <a16:creationId xmlns:a16="http://schemas.microsoft.com/office/drawing/2014/main" id="{F7328A61-BBA1-401A-9B55-8FDAB4EC06D3}"/>
+              </a:ext>
+            </a:extLst>
+          </p:cNvPr>
+          <p:cNvPicPr>
+            <a:picLocks noChangeAspect="1" noChangeArrowheads="1"/>
+          </p:cNvPicPr>
+          <p:nvPr/>
+        </p:nvPicPr>
+        <p:blipFill>
+          <a:blip r:embed="rId4">
+            <a:extLst>
+              <a:ext uri="{28A0092B-C50C-407E-A947-70E740481C1C}">
+                <a14:useLocalDpi xmlns:a14="http://schemas.microsoft.com/office/drawing/2010/main" val="0"/>
+              </a:ext>
+            </a:extLst>
+          </a:blip>
+          <a:srcRect/>
+          <a:stretch>
+            <a:fillRect/>
+          </a:stretch>
+        </p:blipFill>
+        <p:spPr bwMode="auto">
+          <a:xfrm>
+            <a:off x="2747404" y="872147"/>
+            <a:ext cx="4617715" cy="5971005"/>
+          </a:xfrm>
+          <a:prstGeom prst="rect">
+            <a:avLst/>
+          </a:prstGeom>
+          <a:noFill/>
+          <a:extLst>
+            <a:ext uri="{909E8E84-426E-40DD-AFC4-6F175D3DCCD1}">
+              <a14:hiddenFill xmlns:a14="http://schemas.microsoft.com/office/drawing/2010/main">
+                <a:solidFill>
+                  <a:srgbClr val="FFFFFF"/>
+                </a:solidFill>
+              </a14:hiddenFill>
+            </a:ext>
+          </a:extLst>
+        </p:spPr>
+      </p:pic>
+    </p:spTree>
+    <p:extLst>
+      <p:ext uri="{BB962C8B-B14F-4D97-AF65-F5344CB8AC3E}">
+        <p14:creationId xmlns:p14="http://schemas.microsoft.com/office/powerpoint/2010/main" val="1557593455"/>
       </p:ext>
     </p:extLst>
   </p:cSld>

</xml_diff>